<commit_message>
First run through minus inference.
</commit_message>
<xml_diff>
--- a/media/study-design.pptx
+++ b/media/study-design.pptx
@@ -6,6 +6,8 @@
   </p:sldMasterIdLst>
   <p:sldIdLst>
     <p:sldId id="256" r:id="rId2"/>
+    <p:sldId id="257" r:id="rId3"/>
+    <p:sldId id="258" r:id="rId4"/>
   </p:sldIdLst>
   <p:sldSz cx="12192000" cy="6858000"/>
   <p:notesSz cx="6858000" cy="9144000"/>
@@ -3304,10 +3306,10 @@
       </p:grpSpPr>
       <p:grpSp>
         <p:nvGrpSpPr>
-          <p:cNvPr id="8" name="Group 7">
+          <p:cNvPr id="14" name="Group 13">
             <a:extLst>
               <a:ext uri="{FF2B5EF4-FFF2-40B4-BE49-F238E27FC236}">
-                <a16:creationId xmlns:a16="http://schemas.microsoft.com/office/drawing/2014/main" id="{76B4DDFD-B92F-3842-BA1D-CA45E9267048}"/>
+                <a16:creationId xmlns:a16="http://schemas.microsoft.com/office/drawing/2014/main" id="{44580918-8D7C-2943-AA34-6EC57892EADE}"/>
               </a:ext>
             </a:extLst>
           </p:cNvPr>
@@ -6433,6 +6435,3454 @@
     <p:extLst>
       <p:ext uri="{BB962C8B-B14F-4D97-AF65-F5344CB8AC3E}">
         <p14:creationId xmlns:p14="http://schemas.microsoft.com/office/powerpoint/2010/main" val="2864305360"/>
+      </p:ext>
+    </p:extLst>
+  </p:cSld>
+  <p:clrMapOvr>
+    <a:masterClrMapping/>
+  </p:clrMapOvr>
+</p:sld>
+</file>
+
+<file path=ppt/slides/slide2.xml><?xml version="1.0" encoding="utf-8"?>
+<p:sld xmlns:a="http://schemas.openxmlformats.org/drawingml/2006/main" xmlns:r="http://schemas.openxmlformats.org/officeDocument/2006/relationships" xmlns:p="http://schemas.openxmlformats.org/presentationml/2006/main">
+  <p:cSld>
+    <p:spTree>
+      <p:nvGrpSpPr>
+        <p:cNvPr id="1" name=""/>
+        <p:cNvGrpSpPr/>
+        <p:nvPr/>
+      </p:nvGrpSpPr>
+      <p:grpSpPr>
+        <a:xfrm>
+          <a:off x="0" y="0"/>
+          <a:ext cx="0" cy="0"/>
+          <a:chOff x="0" y="0"/>
+          <a:chExt cx="0" cy="0"/>
+        </a:xfrm>
+      </p:grpSpPr>
+      <p:grpSp>
+        <p:nvGrpSpPr>
+          <p:cNvPr id="335" name="Group 334">
+            <a:extLst>
+              <a:ext uri="{FF2B5EF4-FFF2-40B4-BE49-F238E27FC236}">
+                <a16:creationId xmlns:a16="http://schemas.microsoft.com/office/drawing/2014/main" id="{974E2321-4257-A849-83C8-A3C56F83A363}"/>
+              </a:ext>
+            </a:extLst>
+          </p:cNvPr>
+          <p:cNvGrpSpPr/>
+          <p:nvPr/>
+        </p:nvGrpSpPr>
+        <p:grpSpPr>
+          <a:xfrm>
+            <a:off x="919807" y="247882"/>
+            <a:ext cx="6192193" cy="4501916"/>
+            <a:chOff x="919807" y="247882"/>
+            <a:chExt cx="6192193" cy="4501916"/>
+          </a:xfrm>
+        </p:grpSpPr>
+        <p:grpSp>
+          <p:nvGrpSpPr>
+            <p:cNvPr id="334" name="Group 333">
+              <a:extLst>
+                <a:ext uri="{FF2B5EF4-FFF2-40B4-BE49-F238E27FC236}">
+                  <a16:creationId xmlns:a16="http://schemas.microsoft.com/office/drawing/2014/main" id="{180FDCFA-C4A4-6840-B8B0-D0E4D53C0E7E}"/>
+                </a:ext>
+              </a:extLst>
+            </p:cNvPr>
+            <p:cNvGrpSpPr/>
+            <p:nvPr/>
+          </p:nvGrpSpPr>
+          <p:grpSpPr>
+            <a:xfrm>
+              <a:off x="919807" y="247882"/>
+              <a:ext cx="6192193" cy="4501916"/>
+              <a:chOff x="919807" y="247882"/>
+              <a:chExt cx="6192193" cy="4501916"/>
+            </a:xfrm>
+          </p:grpSpPr>
+          <p:sp>
+            <p:nvSpPr>
+              <p:cNvPr id="309" name="Rectangle 308">
+                <a:extLst>
+                  <a:ext uri="{FF2B5EF4-FFF2-40B4-BE49-F238E27FC236}">
+                    <a16:creationId xmlns:a16="http://schemas.microsoft.com/office/drawing/2014/main" id="{83CD4A72-43A2-5948-9356-1D43EDDA1B0F}"/>
+                  </a:ext>
+                </a:extLst>
+              </p:cNvPr>
+              <p:cNvSpPr/>
+              <p:nvPr/>
+            </p:nvSpPr>
+            <p:spPr>
+              <a:xfrm>
+                <a:off x="919807" y="247882"/>
+                <a:ext cx="6192193" cy="4501916"/>
+              </a:xfrm>
+              <a:prstGeom prst="rect">
+                <a:avLst/>
+              </a:prstGeom>
+              <a:solidFill>
+                <a:schemeClr val="bg1"/>
+              </a:solidFill>
+              <a:ln>
+                <a:noFill/>
+              </a:ln>
+            </p:spPr>
+            <p:style>
+              <a:lnRef idx="2">
+                <a:schemeClr val="accent1">
+                  <a:shade val="50000"/>
+                </a:schemeClr>
+              </a:lnRef>
+              <a:fillRef idx="1">
+                <a:schemeClr val="accent1"/>
+              </a:fillRef>
+              <a:effectRef idx="0">
+                <a:schemeClr val="accent1"/>
+              </a:effectRef>
+              <a:fontRef idx="minor">
+                <a:schemeClr val="lt1"/>
+              </a:fontRef>
+            </p:style>
+            <p:txBody>
+              <a:bodyPr rtlCol="0" anchor="ctr"/>
+              <a:lstStyle/>
+              <a:p>
+                <a:pPr algn="ctr"/>
+                <a:endParaRPr lang="en-US"/>
+              </a:p>
+            </p:txBody>
+          </p:sp>
+          <p:sp>
+            <p:nvSpPr>
+              <p:cNvPr id="4" name="Oval 3">
+                <a:extLst>
+                  <a:ext uri="{FF2B5EF4-FFF2-40B4-BE49-F238E27FC236}">
+                    <a16:creationId xmlns:a16="http://schemas.microsoft.com/office/drawing/2014/main" id="{1CBC504F-8D83-AB4A-949B-9BFA0DE0227C}"/>
+                  </a:ext>
+                </a:extLst>
+              </p:cNvPr>
+              <p:cNvSpPr/>
+              <p:nvPr/>
+            </p:nvSpPr>
+            <p:spPr>
+              <a:xfrm>
+                <a:off x="1498714" y="965200"/>
+                <a:ext cx="152400" cy="152400"/>
+              </a:xfrm>
+              <a:prstGeom prst="ellipse">
+                <a:avLst/>
+              </a:prstGeom>
+              <a:solidFill>
+                <a:schemeClr val="bg2"/>
+              </a:solidFill>
+            </p:spPr>
+            <p:style>
+              <a:lnRef idx="2">
+                <a:schemeClr val="accent1">
+                  <a:shade val="50000"/>
+                </a:schemeClr>
+              </a:lnRef>
+              <a:fillRef idx="1">
+                <a:schemeClr val="accent1"/>
+              </a:fillRef>
+              <a:effectRef idx="0">
+                <a:schemeClr val="accent1"/>
+              </a:effectRef>
+              <a:fontRef idx="minor">
+                <a:schemeClr val="lt1"/>
+              </a:fontRef>
+            </p:style>
+            <p:txBody>
+              <a:bodyPr rtlCol="0" anchor="ctr"/>
+              <a:lstStyle/>
+              <a:p>
+                <a:pPr algn="ctr"/>
+                <a:endParaRPr lang="en-US"/>
+              </a:p>
+            </p:txBody>
+          </p:sp>
+          <p:sp>
+            <p:nvSpPr>
+              <p:cNvPr id="20" name="Oval 19">
+                <a:extLst>
+                  <a:ext uri="{FF2B5EF4-FFF2-40B4-BE49-F238E27FC236}">
+                    <a16:creationId xmlns:a16="http://schemas.microsoft.com/office/drawing/2014/main" id="{F5F6E996-C391-D248-A939-D06F59BFECB1}"/>
+                  </a:ext>
+                </a:extLst>
+              </p:cNvPr>
+              <p:cNvSpPr/>
+              <p:nvPr/>
+            </p:nvSpPr>
+            <p:spPr>
+              <a:xfrm>
+                <a:off x="1498714" y="3198880"/>
+                <a:ext cx="152400" cy="152400"/>
+              </a:xfrm>
+              <a:prstGeom prst="ellipse">
+                <a:avLst/>
+              </a:prstGeom>
+              <a:solidFill>
+                <a:schemeClr val="accent4">
+                  <a:lumMod val="60000"/>
+                  <a:lumOff val="40000"/>
+                </a:schemeClr>
+              </a:solidFill>
+            </p:spPr>
+            <p:style>
+              <a:lnRef idx="2">
+                <a:schemeClr val="accent1">
+                  <a:shade val="50000"/>
+                </a:schemeClr>
+              </a:lnRef>
+              <a:fillRef idx="1">
+                <a:schemeClr val="accent1"/>
+              </a:fillRef>
+              <a:effectRef idx="0">
+                <a:schemeClr val="accent1"/>
+              </a:effectRef>
+              <a:fontRef idx="minor">
+                <a:schemeClr val="lt1"/>
+              </a:fontRef>
+            </p:style>
+            <p:txBody>
+              <a:bodyPr rtlCol="0" anchor="ctr"/>
+              <a:lstStyle/>
+              <a:p>
+                <a:pPr algn="ctr"/>
+                <a:endParaRPr lang="en-US"/>
+              </a:p>
+            </p:txBody>
+          </p:sp>
+          <p:cxnSp>
+            <p:nvCxnSpPr>
+              <p:cNvPr id="41" name="Straight Arrow Connector 40">
+                <a:extLst>
+                  <a:ext uri="{FF2B5EF4-FFF2-40B4-BE49-F238E27FC236}">
+                    <a16:creationId xmlns:a16="http://schemas.microsoft.com/office/drawing/2014/main" id="{1D694DAB-E216-FF4B-8157-BE9622C73195}"/>
+                  </a:ext>
+                </a:extLst>
+              </p:cNvPr>
+              <p:cNvCxnSpPr>
+                <a:cxnSpLocks/>
+                <a:stCxn id="4" idx="6"/>
+              </p:cNvCxnSpPr>
+              <p:nvPr/>
+            </p:nvCxnSpPr>
+            <p:spPr>
+              <a:xfrm>
+                <a:off x="1651114" y="1041400"/>
+                <a:ext cx="3716753" cy="0"/>
+              </a:xfrm>
+              <a:prstGeom prst="straightConnector1">
+                <a:avLst/>
+              </a:prstGeom>
+              <a:ln>
+                <a:prstDash val="dash"/>
+                <a:tailEnd type="triangle"/>
+              </a:ln>
+            </p:spPr>
+            <p:style>
+              <a:lnRef idx="1">
+                <a:schemeClr val="accent1"/>
+              </a:lnRef>
+              <a:fillRef idx="0">
+                <a:schemeClr val="accent1"/>
+              </a:fillRef>
+              <a:effectRef idx="0">
+                <a:schemeClr val="accent1"/>
+              </a:effectRef>
+              <a:fontRef idx="minor">
+                <a:schemeClr val="tx1"/>
+              </a:fontRef>
+            </p:style>
+          </p:cxnSp>
+          <p:sp>
+            <p:nvSpPr>
+              <p:cNvPr id="44" name="Oval 43">
+                <a:extLst>
+                  <a:ext uri="{FF2B5EF4-FFF2-40B4-BE49-F238E27FC236}">
+                    <a16:creationId xmlns:a16="http://schemas.microsoft.com/office/drawing/2014/main" id="{56A4AC1F-B60B-044C-BD8C-F72465BCC9AD}"/>
+                  </a:ext>
+                </a:extLst>
+              </p:cNvPr>
+              <p:cNvSpPr/>
+              <p:nvPr/>
+            </p:nvSpPr>
+            <p:spPr>
+              <a:xfrm>
+                <a:off x="1498714" y="1244410"/>
+                <a:ext cx="152400" cy="152400"/>
+              </a:xfrm>
+              <a:prstGeom prst="ellipse">
+                <a:avLst/>
+              </a:prstGeom>
+              <a:solidFill>
+                <a:schemeClr val="bg2"/>
+              </a:solidFill>
+            </p:spPr>
+            <p:style>
+              <a:lnRef idx="2">
+                <a:schemeClr val="accent1">
+                  <a:shade val="50000"/>
+                </a:schemeClr>
+              </a:lnRef>
+              <a:fillRef idx="1">
+                <a:schemeClr val="accent1"/>
+              </a:fillRef>
+              <a:effectRef idx="0">
+                <a:schemeClr val="accent1"/>
+              </a:effectRef>
+              <a:fontRef idx="minor">
+                <a:schemeClr val="lt1"/>
+              </a:fontRef>
+            </p:style>
+            <p:txBody>
+              <a:bodyPr rtlCol="0" anchor="ctr"/>
+              <a:lstStyle/>
+              <a:p>
+                <a:pPr algn="ctr"/>
+                <a:endParaRPr lang="en-US"/>
+              </a:p>
+            </p:txBody>
+          </p:sp>
+          <p:cxnSp>
+            <p:nvCxnSpPr>
+              <p:cNvPr id="45" name="Straight Arrow Connector 44">
+                <a:extLst>
+                  <a:ext uri="{FF2B5EF4-FFF2-40B4-BE49-F238E27FC236}">
+                    <a16:creationId xmlns:a16="http://schemas.microsoft.com/office/drawing/2014/main" id="{3257A3F9-4A34-784B-85CE-694A08B13BEB}"/>
+                  </a:ext>
+                </a:extLst>
+              </p:cNvPr>
+              <p:cNvCxnSpPr>
+                <a:cxnSpLocks/>
+                <a:stCxn id="44" idx="6"/>
+              </p:cNvCxnSpPr>
+              <p:nvPr/>
+            </p:nvCxnSpPr>
+            <p:spPr>
+              <a:xfrm>
+                <a:off x="1651114" y="1320610"/>
+                <a:ext cx="3716753" cy="0"/>
+              </a:xfrm>
+              <a:prstGeom prst="straightConnector1">
+                <a:avLst/>
+              </a:prstGeom>
+              <a:ln>
+                <a:prstDash val="dash"/>
+                <a:tailEnd type="triangle"/>
+              </a:ln>
+            </p:spPr>
+            <p:style>
+              <a:lnRef idx="1">
+                <a:schemeClr val="accent1"/>
+              </a:lnRef>
+              <a:fillRef idx="0">
+                <a:schemeClr val="accent1"/>
+              </a:fillRef>
+              <a:effectRef idx="0">
+                <a:schemeClr val="accent1"/>
+              </a:effectRef>
+              <a:fontRef idx="minor">
+                <a:schemeClr val="tx1"/>
+              </a:fontRef>
+            </p:style>
+          </p:cxnSp>
+          <p:sp>
+            <p:nvSpPr>
+              <p:cNvPr id="46" name="Oval 45">
+                <a:extLst>
+                  <a:ext uri="{FF2B5EF4-FFF2-40B4-BE49-F238E27FC236}">
+                    <a16:creationId xmlns:a16="http://schemas.microsoft.com/office/drawing/2014/main" id="{87309931-BEAA-214B-8EAD-B1DB3E35D05A}"/>
+                  </a:ext>
+                </a:extLst>
+              </p:cNvPr>
+              <p:cNvSpPr/>
+              <p:nvPr/>
+            </p:nvSpPr>
+            <p:spPr>
+              <a:xfrm>
+                <a:off x="1498714" y="1523620"/>
+                <a:ext cx="152400" cy="152400"/>
+              </a:xfrm>
+              <a:prstGeom prst="ellipse">
+                <a:avLst/>
+              </a:prstGeom>
+              <a:solidFill>
+                <a:schemeClr val="bg2"/>
+              </a:solidFill>
+            </p:spPr>
+            <p:style>
+              <a:lnRef idx="2">
+                <a:schemeClr val="accent1">
+                  <a:shade val="50000"/>
+                </a:schemeClr>
+              </a:lnRef>
+              <a:fillRef idx="1">
+                <a:schemeClr val="accent1"/>
+              </a:fillRef>
+              <a:effectRef idx="0">
+                <a:schemeClr val="accent1"/>
+              </a:effectRef>
+              <a:fontRef idx="minor">
+                <a:schemeClr val="lt1"/>
+              </a:fontRef>
+            </p:style>
+            <p:txBody>
+              <a:bodyPr rtlCol="0" anchor="ctr"/>
+              <a:lstStyle/>
+              <a:p>
+                <a:pPr algn="ctr"/>
+                <a:endParaRPr lang="en-US"/>
+              </a:p>
+            </p:txBody>
+          </p:sp>
+          <p:cxnSp>
+            <p:nvCxnSpPr>
+              <p:cNvPr id="47" name="Straight Arrow Connector 46">
+                <a:extLst>
+                  <a:ext uri="{FF2B5EF4-FFF2-40B4-BE49-F238E27FC236}">
+                    <a16:creationId xmlns:a16="http://schemas.microsoft.com/office/drawing/2014/main" id="{E1F2A3C9-BB62-5541-871D-993DEC03A6AA}"/>
+                  </a:ext>
+                </a:extLst>
+              </p:cNvPr>
+              <p:cNvCxnSpPr>
+                <a:cxnSpLocks/>
+                <a:stCxn id="46" idx="6"/>
+              </p:cNvCxnSpPr>
+              <p:nvPr/>
+            </p:nvCxnSpPr>
+            <p:spPr>
+              <a:xfrm>
+                <a:off x="1651114" y="1599820"/>
+                <a:ext cx="931219" cy="0"/>
+              </a:xfrm>
+              <a:prstGeom prst="straightConnector1">
+                <a:avLst/>
+              </a:prstGeom>
+              <a:ln>
+                <a:prstDash val="dash"/>
+                <a:tailEnd type="triangle"/>
+              </a:ln>
+            </p:spPr>
+            <p:style>
+              <a:lnRef idx="1">
+                <a:schemeClr val="accent1"/>
+              </a:lnRef>
+              <a:fillRef idx="0">
+                <a:schemeClr val="accent1"/>
+              </a:fillRef>
+              <a:effectRef idx="0">
+                <a:schemeClr val="accent1"/>
+              </a:effectRef>
+              <a:fontRef idx="minor">
+                <a:schemeClr val="tx1"/>
+              </a:fontRef>
+            </p:style>
+          </p:cxnSp>
+          <p:sp>
+            <p:nvSpPr>
+              <p:cNvPr id="48" name="Oval 47">
+                <a:extLst>
+                  <a:ext uri="{FF2B5EF4-FFF2-40B4-BE49-F238E27FC236}">
+                    <a16:creationId xmlns:a16="http://schemas.microsoft.com/office/drawing/2014/main" id="{747D5FF1-3655-044D-A043-D63C9BBF2F4D}"/>
+                  </a:ext>
+                </a:extLst>
+              </p:cNvPr>
+              <p:cNvSpPr/>
+              <p:nvPr/>
+            </p:nvSpPr>
+            <p:spPr>
+              <a:xfrm>
+                <a:off x="1498714" y="1802830"/>
+                <a:ext cx="152400" cy="152400"/>
+              </a:xfrm>
+              <a:prstGeom prst="ellipse">
+                <a:avLst/>
+              </a:prstGeom>
+              <a:solidFill>
+                <a:schemeClr val="bg2"/>
+              </a:solidFill>
+            </p:spPr>
+            <p:style>
+              <a:lnRef idx="2">
+                <a:schemeClr val="accent1">
+                  <a:shade val="50000"/>
+                </a:schemeClr>
+              </a:lnRef>
+              <a:fillRef idx="1">
+                <a:schemeClr val="accent1"/>
+              </a:fillRef>
+              <a:effectRef idx="0">
+                <a:schemeClr val="accent1"/>
+              </a:effectRef>
+              <a:fontRef idx="minor">
+                <a:schemeClr val="lt1"/>
+              </a:fontRef>
+            </p:style>
+            <p:txBody>
+              <a:bodyPr rtlCol="0" anchor="ctr"/>
+              <a:lstStyle/>
+              <a:p>
+                <a:pPr algn="ctr"/>
+                <a:endParaRPr lang="en-US"/>
+              </a:p>
+            </p:txBody>
+          </p:sp>
+          <p:cxnSp>
+            <p:nvCxnSpPr>
+              <p:cNvPr id="49" name="Straight Arrow Connector 48">
+                <a:extLst>
+                  <a:ext uri="{FF2B5EF4-FFF2-40B4-BE49-F238E27FC236}">
+                    <a16:creationId xmlns:a16="http://schemas.microsoft.com/office/drawing/2014/main" id="{2C444093-0691-F946-AAAD-24546098D558}"/>
+                  </a:ext>
+                </a:extLst>
+              </p:cNvPr>
+              <p:cNvCxnSpPr>
+                <a:cxnSpLocks/>
+                <a:stCxn id="48" idx="6"/>
+              </p:cNvCxnSpPr>
+              <p:nvPr/>
+            </p:nvCxnSpPr>
+            <p:spPr>
+              <a:xfrm>
+                <a:off x="1651114" y="1879030"/>
+                <a:ext cx="3716753" cy="0"/>
+              </a:xfrm>
+              <a:prstGeom prst="straightConnector1">
+                <a:avLst/>
+              </a:prstGeom>
+              <a:ln>
+                <a:prstDash val="dash"/>
+                <a:tailEnd type="triangle"/>
+              </a:ln>
+            </p:spPr>
+            <p:style>
+              <a:lnRef idx="1">
+                <a:schemeClr val="accent1"/>
+              </a:lnRef>
+              <a:fillRef idx="0">
+                <a:schemeClr val="accent1"/>
+              </a:fillRef>
+              <a:effectRef idx="0">
+                <a:schemeClr val="accent1"/>
+              </a:effectRef>
+              <a:fontRef idx="minor">
+                <a:schemeClr val="tx1"/>
+              </a:fontRef>
+            </p:style>
+          </p:cxnSp>
+          <p:sp>
+            <p:nvSpPr>
+              <p:cNvPr id="50" name="Oval 49">
+                <a:extLst>
+                  <a:ext uri="{FF2B5EF4-FFF2-40B4-BE49-F238E27FC236}">
+                    <a16:creationId xmlns:a16="http://schemas.microsoft.com/office/drawing/2014/main" id="{15783769-A496-1544-9B1B-DEB20A7B64A5}"/>
+                  </a:ext>
+                </a:extLst>
+              </p:cNvPr>
+              <p:cNvSpPr/>
+              <p:nvPr/>
+            </p:nvSpPr>
+            <p:spPr>
+              <a:xfrm>
+                <a:off x="1498714" y="2082040"/>
+                <a:ext cx="152400" cy="152400"/>
+              </a:xfrm>
+              <a:prstGeom prst="ellipse">
+                <a:avLst/>
+              </a:prstGeom>
+              <a:solidFill>
+                <a:schemeClr val="bg2"/>
+              </a:solidFill>
+            </p:spPr>
+            <p:style>
+              <a:lnRef idx="2">
+                <a:schemeClr val="accent1">
+                  <a:shade val="50000"/>
+                </a:schemeClr>
+              </a:lnRef>
+              <a:fillRef idx="1">
+                <a:schemeClr val="accent1"/>
+              </a:fillRef>
+              <a:effectRef idx="0">
+                <a:schemeClr val="accent1"/>
+              </a:effectRef>
+              <a:fontRef idx="minor">
+                <a:schemeClr val="lt1"/>
+              </a:fontRef>
+            </p:style>
+            <p:txBody>
+              <a:bodyPr rtlCol="0" anchor="ctr"/>
+              <a:lstStyle/>
+              <a:p>
+                <a:pPr algn="ctr"/>
+                <a:endParaRPr lang="en-US"/>
+              </a:p>
+            </p:txBody>
+          </p:sp>
+          <p:cxnSp>
+            <p:nvCxnSpPr>
+              <p:cNvPr id="51" name="Straight Arrow Connector 50">
+                <a:extLst>
+                  <a:ext uri="{FF2B5EF4-FFF2-40B4-BE49-F238E27FC236}">
+                    <a16:creationId xmlns:a16="http://schemas.microsoft.com/office/drawing/2014/main" id="{0391AB84-9DC1-5D49-905D-84499D203E94}"/>
+                  </a:ext>
+                </a:extLst>
+              </p:cNvPr>
+              <p:cNvCxnSpPr>
+                <a:cxnSpLocks/>
+                <a:stCxn id="50" idx="6"/>
+              </p:cNvCxnSpPr>
+              <p:nvPr/>
+            </p:nvCxnSpPr>
+            <p:spPr>
+              <a:xfrm>
+                <a:off x="1651114" y="2158240"/>
+                <a:ext cx="2116553" cy="0"/>
+              </a:xfrm>
+              <a:prstGeom prst="straightConnector1">
+                <a:avLst/>
+              </a:prstGeom>
+              <a:ln>
+                <a:prstDash val="dash"/>
+                <a:tailEnd type="triangle"/>
+              </a:ln>
+            </p:spPr>
+            <p:style>
+              <a:lnRef idx="1">
+                <a:schemeClr val="accent1"/>
+              </a:lnRef>
+              <a:fillRef idx="0">
+                <a:schemeClr val="accent1"/>
+              </a:fillRef>
+              <a:effectRef idx="0">
+                <a:schemeClr val="accent1"/>
+              </a:effectRef>
+              <a:fontRef idx="minor">
+                <a:schemeClr val="tx1"/>
+              </a:fontRef>
+            </p:style>
+          </p:cxnSp>
+          <p:sp>
+            <p:nvSpPr>
+              <p:cNvPr id="52" name="Oval 51">
+                <a:extLst>
+                  <a:ext uri="{FF2B5EF4-FFF2-40B4-BE49-F238E27FC236}">
+                    <a16:creationId xmlns:a16="http://schemas.microsoft.com/office/drawing/2014/main" id="{F99471B5-0F4E-AE45-8611-C81EABD38A6D}"/>
+                  </a:ext>
+                </a:extLst>
+              </p:cNvPr>
+              <p:cNvSpPr/>
+              <p:nvPr/>
+            </p:nvSpPr>
+            <p:spPr>
+              <a:xfrm>
+                <a:off x="1498714" y="2361250"/>
+                <a:ext cx="152400" cy="152400"/>
+              </a:xfrm>
+              <a:prstGeom prst="ellipse">
+                <a:avLst/>
+              </a:prstGeom>
+              <a:solidFill>
+                <a:schemeClr val="bg2"/>
+              </a:solidFill>
+            </p:spPr>
+            <p:style>
+              <a:lnRef idx="2">
+                <a:schemeClr val="accent1">
+                  <a:shade val="50000"/>
+                </a:schemeClr>
+              </a:lnRef>
+              <a:fillRef idx="1">
+                <a:schemeClr val="accent1"/>
+              </a:fillRef>
+              <a:effectRef idx="0">
+                <a:schemeClr val="accent1"/>
+              </a:effectRef>
+              <a:fontRef idx="minor">
+                <a:schemeClr val="lt1"/>
+              </a:fontRef>
+            </p:style>
+            <p:txBody>
+              <a:bodyPr rtlCol="0" anchor="ctr"/>
+              <a:lstStyle/>
+              <a:p>
+                <a:pPr algn="ctr"/>
+                <a:endParaRPr lang="en-US"/>
+              </a:p>
+            </p:txBody>
+          </p:sp>
+          <p:cxnSp>
+            <p:nvCxnSpPr>
+              <p:cNvPr id="53" name="Straight Arrow Connector 52">
+                <a:extLst>
+                  <a:ext uri="{FF2B5EF4-FFF2-40B4-BE49-F238E27FC236}">
+                    <a16:creationId xmlns:a16="http://schemas.microsoft.com/office/drawing/2014/main" id="{6B07B0B6-8C56-1F48-8EB9-AA01D1AE63AA}"/>
+                  </a:ext>
+                </a:extLst>
+              </p:cNvPr>
+              <p:cNvCxnSpPr>
+                <a:cxnSpLocks/>
+                <a:stCxn id="52" idx="6"/>
+              </p:cNvCxnSpPr>
+              <p:nvPr/>
+            </p:nvCxnSpPr>
+            <p:spPr>
+              <a:xfrm>
+                <a:off x="1651114" y="2437450"/>
+                <a:ext cx="3716753" cy="4043"/>
+              </a:xfrm>
+              <a:prstGeom prst="straightConnector1">
+                <a:avLst/>
+              </a:prstGeom>
+              <a:ln>
+                <a:prstDash val="dash"/>
+                <a:tailEnd type="triangle"/>
+              </a:ln>
+            </p:spPr>
+            <p:style>
+              <a:lnRef idx="1">
+                <a:schemeClr val="accent1"/>
+              </a:lnRef>
+              <a:fillRef idx="0">
+                <a:schemeClr val="accent1"/>
+              </a:fillRef>
+              <a:effectRef idx="0">
+                <a:schemeClr val="accent1"/>
+              </a:effectRef>
+              <a:fontRef idx="minor">
+                <a:schemeClr val="tx1"/>
+              </a:fontRef>
+            </p:style>
+          </p:cxnSp>
+          <p:sp>
+            <p:nvSpPr>
+              <p:cNvPr id="54" name="Oval 53">
+                <a:extLst>
+                  <a:ext uri="{FF2B5EF4-FFF2-40B4-BE49-F238E27FC236}">
+                    <a16:creationId xmlns:a16="http://schemas.microsoft.com/office/drawing/2014/main" id="{3F64A38B-5B2C-3142-B264-E3854EBF315B}"/>
+                  </a:ext>
+                </a:extLst>
+              </p:cNvPr>
+              <p:cNvSpPr/>
+              <p:nvPr/>
+            </p:nvSpPr>
+            <p:spPr>
+              <a:xfrm>
+                <a:off x="1498714" y="2640460"/>
+                <a:ext cx="152400" cy="152400"/>
+              </a:xfrm>
+              <a:prstGeom prst="ellipse">
+                <a:avLst/>
+              </a:prstGeom>
+              <a:solidFill>
+                <a:schemeClr val="bg2"/>
+              </a:solidFill>
+            </p:spPr>
+            <p:style>
+              <a:lnRef idx="2">
+                <a:schemeClr val="accent1">
+                  <a:shade val="50000"/>
+                </a:schemeClr>
+              </a:lnRef>
+              <a:fillRef idx="1">
+                <a:schemeClr val="accent1"/>
+              </a:fillRef>
+              <a:effectRef idx="0">
+                <a:schemeClr val="accent1"/>
+              </a:effectRef>
+              <a:fontRef idx="minor">
+                <a:schemeClr val="lt1"/>
+              </a:fontRef>
+            </p:style>
+            <p:txBody>
+              <a:bodyPr rtlCol="0" anchor="ctr"/>
+              <a:lstStyle/>
+              <a:p>
+                <a:pPr algn="ctr"/>
+                <a:endParaRPr lang="en-US"/>
+              </a:p>
+            </p:txBody>
+          </p:sp>
+          <p:cxnSp>
+            <p:nvCxnSpPr>
+              <p:cNvPr id="55" name="Straight Arrow Connector 54">
+                <a:extLst>
+                  <a:ext uri="{FF2B5EF4-FFF2-40B4-BE49-F238E27FC236}">
+                    <a16:creationId xmlns:a16="http://schemas.microsoft.com/office/drawing/2014/main" id="{AC4610A9-BA3D-DE41-8941-4D193E3FAC17}"/>
+                  </a:ext>
+                </a:extLst>
+              </p:cNvPr>
+              <p:cNvCxnSpPr>
+                <a:cxnSpLocks/>
+                <a:stCxn id="54" idx="6"/>
+              </p:cNvCxnSpPr>
+              <p:nvPr/>
+            </p:nvCxnSpPr>
+            <p:spPr>
+              <a:xfrm flipV="1">
+                <a:off x="1651114" y="2712428"/>
+                <a:ext cx="2116553" cy="4232"/>
+              </a:xfrm>
+              <a:prstGeom prst="straightConnector1">
+                <a:avLst/>
+              </a:prstGeom>
+              <a:ln>
+                <a:prstDash val="dash"/>
+                <a:tailEnd type="triangle"/>
+              </a:ln>
+            </p:spPr>
+            <p:style>
+              <a:lnRef idx="1">
+                <a:schemeClr val="accent1"/>
+              </a:lnRef>
+              <a:fillRef idx="0">
+                <a:schemeClr val="accent1"/>
+              </a:fillRef>
+              <a:effectRef idx="0">
+                <a:schemeClr val="accent1"/>
+              </a:effectRef>
+              <a:fontRef idx="minor">
+                <a:schemeClr val="tx1"/>
+              </a:fontRef>
+            </p:style>
+          </p:cxnSp>
+          <p:sp>
+            <p:nvSpPr>
+              <p:cNvPr id="56" name="Oval 55">
+                <a:extLst>
+                  <a:ext uri="{FF2B5EF4-FFF2-40B4-BE49-F238E27FC236}">
+                    <a16:creationId xmlns:a16="http://schemas.microsoft.com/office/drawing/2014/main" id="{C65EE6D3-5C69-DC44-8298-61001A9797C9}"/>
+                  </a:ext>
+                </a:extLst>
+              </p:cNvPr>
+              <p:cNvSpPr/>
+              <p:nvPr/>
+            </p:nvSpPr>
+            <p:spPr>
+              <a:xfrm>
+                <a:off x="1498714" y="2919670"/>
+                <a:ext cx="152400" cy="152400"/>
+              </a:xfrm>
+              <a:prstGeom prst="ellipse">
+                <a:avLst/>
+              </a:prstGeom>
+              <a:solidFill>
+                <a:schemeClr val="bg2"/>
+              </a:solidFill>
+            </p:spPr>
+            <p:style>
+              <a:lnRef idx="2">
+                <a:schemeClr val="accent1">
+                  <a:shade val="50000"/>
+                </a:schemeClr>
+              </a:lnRef>
+              <a:fillRef idx="1">
+                <a:schemeClr val="accent1"/>
+              </a:fillRef>
+              <a:effectRef idx="0">
+                <a:schemeClr val="accent1"/>
+              </a:effectRef>
+              <a:fontRef idx="minor">
+                <a:schemeClr val="lt1"/>
+              </a:fontRef>
+            </p:style>
+            <p:txBody>
+              <a:bodyPr rtlCol="0" anchor="ctr"/>
+              <a:lstStyle/>
+              <a:p>
+                <a:pPr algn="ctr"/>
+                <a:endParaRPr lang="en-US"/>
+              </a:p>
+            </p:txBody>
+          </p:sp>
+          <p:cxnSp>
+            <p:nvCxnSpPr>
+              <p:cNvPr id="57" name="Straight Arrow Connector 56">
+                <a:extLst>
+                  <a:ext uri="{FF2B5EF4-FFF2-40B4-BE49-F238E27FC236}">
+                    <a16:creationId xmlns:a16="http://schemas.microsoft.com/office/drawing/2014/main" id="{22F3E4E9-9766-764F-8A15-07B23A6F2A36}"/>
+                  </a:ext>
+                </a:extLst>
+              </p:cNvPr>
+              <p:cNvCxnSpPr>
+                <a:cxnSpLocks/>
+                <a:stCxn id="56" idx="6"/>
+              </p:cNvCxnSpPr>
+              <p:nvPr/>
+            </p:nvCxnSpPr>
+            <p:spPr>
+              <a:xfrm>
+                <a:off x="1651114" y="2995870"/>
+                <a:ext cx="1388419" cy="0"/>
+              </a:xfrm>
+              <a:prstGeom prst="straightConnector1">
+                <a:avLst/>
+              </a:prstGeom>
+              <a:ln>
+                <a:prstDash val="dash"/>
+                <a:tailEnd type="triangle"/>
+              </a:ln>
+            </p:spPr>
+            <p:style>
+              <a:lnRef idx="1">
+                <a:schemeClr val="accent1"/>
+              </a:lnRef>
+              <a:fillRef idx="0">
+                <a:schemeClr val="accent1"/>
+              </a:fillRef>
+              <a:effectRef idx="0">
+                <a:schemeClr val="accent1"/>
+              </a:effectRef>
+              <a:fontRef idx="minor">
+                <a:schemeClr val="tx1"/>
+              </a:fontRef>
+            </p:style>
+          </p:cxnSp>
+          <p:cxnSp>
+            <p:nvCxnSpPr>
+              <p:cNvPr id="58" name="Straight Arrow Connector 57">
+                <a:extLst>
+                  <a:ext uri="{FF2B5EF4-FFF2-40B4-BE49-F238E27FC236}">
+                    <a16:creationId xmlns:a16="http://schemas.microsoft.com/office/drawing/2014/main" id="{A9B21103-A9C1-5F4F-902A-65713C889EBD}"/>
+                  </a:ext>
+                </a:extLst>
+              </p:cNvPr>
+              <p:cNvCxnSpPr>
+                <a:cxnSpLocks/>
+              </p:cNvCxnSpPr>
+              <p:nvPr/>
+            </p:nvCxnSpPr>
+            <p:spPr>
+              <a:xfrm>
+                <a:off x="1651114" y="3263903"/>
+                <a:ext cx="3716753" cy="0"/>
+              </a:xfrm>
+              <a:prstGeom prst="straightConnector1">
+                <a:avLst/>
+              </a:prstGeom>
+              <a:ln>
+                <a:prstDash val="dash"/>
+                <a:tailEnd type="triangle"/>
+              </a:ln>
+            </p:spPr>
+            <p:style>
+              <a:lnRef idx="1">
+                <a:schemeClr val="accent1"/>
+              </a:lnRef>
+              <a:fillRef idx="0">
+                <a:schemeClr val="accent1"/>
+              </a:fillRef>
+              <a:effectRef idx="0">
+                <a:schemeClr val="accent1"/>
+              </a:effectRef>
+              <a:fontRef idx="minor">
+                <a:schemeClr val="tx1"/>
+              </a:fontRef>
+            </p:style>
+          </p:cxnSp>
+          <p:sp>
+            <p:nvSpPr>
+              <p:cNvPr id="59" name="Oval 58">
+                <a:extLst>
+                  <a:ext uri="{FF2B5EF4-FFF2-40B4-BE49-F238E27FC236}">
+                    <a16:creationId xmlns:a16="http://schemas.microsoft.com/office/drawing/2014/main" id="{F57E8163-597F-2540-A51D-BC1C5AC46307}"/>
+                  </a:ext>
+                </a:extLst>
+              </p:cNvPr>
+              <p:cNvSpPr/>
+              <p:nvPr/>
+            </p:nvSpPr>
+            <p:spPr>
+              <a:xfrm>
+                <a:off x="1498714" y="3478090"/>
+                <a:ext cx="152400" cy="152400"/>
+              </a:xfrm>
+              <a:prstGeom prst="ellipse">
+                <a:avLst/>
+              </a:prstGeom>
+              <a:solidFill>
+                <a:schemeClr val="accent4">
+                  <a:lumMod val="60000"/>
+                  <a:lumOff val="40000"/>
+                </a:schemeClr>
+              </a:solidFill>
+            </p:spPr>
+            <p:style>
+              <a:lnRef idx="2">
+                <a:schemeClr val="accent1">
+                  <a:shade val="50000"/>
+                </a:schemeClr>
+              </a:lnRef>
+              <a:fillRef idx="1">
+                <a:schemeClr val="accent1"/>
+              </a:fillRef>
+              <a:effectRef idx="0">
+                <a:schemeClr val="accent1"/>
+              </a:effectRef>
+              <a:fontRef idx="minor">
+                <a:schemeClr val="lt1"/>
+              </a:fontRef>
+            </p:style>
+            <p:txBody>
+              <a:bodyPr rtlCol="0" anchor="ctr"/>
+              <a:lstStyle/>
+              <a:p>
+                <a:pPr algn="ctr"/>
+                <a:endParaRPr lang="en-US"/>
+              </a:p>
+            </p:txBody>
+          </p:sp>
+          <p:cxnSp>
+            <p:nvCxnSpPr>
+              <p:cNvPr id="60" name="Straight Arrow Connector 59">
+                <a:extLst>
+                  <a:ext uri="{FF2B5EF4-FFF2-40B4-BE49-F238E27FC236}">
+                    <a16:creationId xmlns:a16="http://schemas.microsoft.com/office/drawing/2014/main" id="{002E2350-931A-BE46-9A8F-61FF8063FE56}"/>
+                  </a:ext>
+                </a:extLst>
+              </p:cNvPr>
+              <p:cNvCxnSpPr>
+                <a:cxnSpLocks/>
+              </p:cNvCxnSpPr>
+              <p:nvPr/>
+            </p:nvCxnSpPr>
+            <p:spPr>
+              <a:xfrm>
+                <a:off x="1651114" y="3517909"/>
+                <a:ext cx="3716753" cy="0"/>
+              </a:xfrm>
+              <a:prstGeom prst="straightConnector1">
+                <a:avLst/>
+              </a:prstGeom>
+              <a:ln>
+                <a:prstDash val="dash"/>
+                <a:tailEnd type="triangle"/>
+              </a:ln>
+            </p:spPr>
+            <p:style>
+              <a:lnRef idx="1">
+                <a:schemeClr val="accent1"/>
+              </a:lnRef>
+              <a:fillRef idx="0">
+                <a:schemeClr val="accent1"/>
+              </a:fillRef>
+              <a:effectRef idx="0">
+                <a:schemeClr val="accent1"/>
+              </a:effectRef>
+              <a:fontRef idx="minor">
+                <a:schemeClr val="tx1"/>
+              </a:fontRef>
+            </p:style>
+          </p:cxnSp>
+          <p:sp>
+            <p:nvSpPr>
+              <p:cNvPr id="61" name="Oval 60">
+                <a:extLst>
+                  <a:ext uri="{FF2B5EF4-FFF2-40B4-BE49-F238E27FC236}">
+                    <a16:creationId xmlns:a16="http://schemas.microsoft.com/office/drawing/2014/main" id="{F8113A16-7D9C-414F-B395-609F96E833BC}"/>
+                  </a:ext>
+                </a:extLst>
+              </p:cNvPr>
+              <p:cNvSpPr/>
+              <p:nvPr/>
+            </p:nvSpPr>
+            <p:spPr>
+              <a:xfrm>
+                <a:off x="1498714" y="3757300"/>
+                <a:ext cx="152400" cy="152400"/>
+              </a:xfrm>
+              <a:prstGeom prst="ellipse">
+                <a:avLst/>
+              </a:prstGeom>
+              <a:solidFill>
+                <a:schemeClr val="accent4">
+                  <a:lumMod val="60000"/>
+                  <a:lumOff val="40000"/>
+                </a:schemeClr>
+              </a:solidFill>
+            </p:spPr>
+            <p:style>
+              <a:lnRef idx="2">
+                <a:schemeClr val="accent1">
+                  <a:shade val="50000"/>
+                </a:schemeClr>
+              </a:lnRef>
+              <a:fillRef idx="1">
+                <a:schemeClr val="accent1"/>
+              </a:fillRef>
+              <a:effectRef idx="0">
+                <a:schemeClr val="accent1"/>
+              </a:effectRef>
+              <a:fontRef idx="minor">
+                <a:schemeClr val="lt1"/>
+              </a:fontRef>
+            </p:style>
+            <p:txBody>
+              <a:bodyPr rtlCol="0" anchor="ctr"/>
+              <a:lstStyle/>
+              <a:p>
+                <a:pPr algn="ctr"/>
+                <a:endParaRPr lang="en-US"/>
+              </a:p>
+            </p:txBody>
+          </p:sp>
+          <p:cxnSp>
+            <p:nvCxnSpPr>
+              <p:cNvPr id="62" name="Straight Arrow Connector 61">
+                <a:extLst>
+                  <a:ext uri="{FF2B5EF4-FFF2-40B4-BE49-F238E27FC236}">
+                    <a16:creationId xmlns:a16="http://schemas.microsoft.com/office/drawing/2014/main" id="{48B70CC5-2068-D248-AB13-57EA6D2EF9FD}"/>
+                  </a:ext>
+                </a:extLst>
+              </p:cNvPr>
+              <p:cNvCxnSpPr>
+                <a:cxnSpLocks/>
+              </p:cNvCxnSpPr>
+              <p:nvPr/>
+            </p:nvCxnSpPr>
+            <p:spPr>
+              <a:xfrm>
+                <a:off x="1651114" y="3812131"/>
+                <a:ext cx="3716753" cy="0"/>
+              </a:xfrm>
+              <a:prstGeom prst="straightConnector1">
+                <a:avLst/>
+              </a:prstGeom>
+              <a:ln>
+                <a:prstDash val="dash"/>
+                <a:tailEnd type="triangle"/>
+              </a:ln>
+            </p:spPr>
+            <p:style>
+              <a:lnRef idx="1">
+                <a:schemeClr val="accent1"/>
+              </a:lnRef>
+              <a:fillRef idx="0">
+                <a:schemeClr val="accent1"/>
+              </a:fillRef>
+              <a:effectRef idx="0">
+                <a:schemeClr val="accent1"/>
+              </a:effectRef>
+              <a:fontRef idx="minor">
+                <a:schemeClr val="tx1"/>
+              </a:fontRef>
+            </p:style>
+          </p:cxnSp>
+          <p:sp>
+            <p:nvSpPr>
+              <p:cNvPr id="63" name="Oval 62">
+                <a:extLst>
+                  <a:ext uri="{FF2B5EF4-FFF2-40B4-BE49-F238E27FC236}">
+                    <a16:creationId xmlns:a16="http://schemas.microsoft.com/office/drawing/2014/main" id="{AB4463BE-82A4-3C4A-BE97-629B8F149045}"/>
+                  </a:ext>
+                </a:extLst>
+              </p:cNvPr>
+              <p:cNvSpPr/>
+              <p:nvPr/>
+            </p:nvSpPr>
+            <p:spPr>
+              <a:xfrm>
+                <a:off x="1498714" y="4036509"/>
+                <a:ext cx="152400" cy="152400"/>
+              </a:xfrm>
+              <a:prstGeom prst="ellipse">
+                <a:avLst/>
+              </a:prstGeom>
+              <a:solidFill>
+                <a:schemeClr val="accent4">
+                  <a:lumMod val="60000"/>
+                  <a:lumOff val="40000"/>
+                </a:schemeClr>
+              </a:solidFill>
+            </p:spPr>
+            <p:style>
+              <a:lnRef idx="2">
+                <a:schemeClr val="accent1">
+                  <a:shade val="50000"/>
+                </a:schemeClr>
+              </a:lnRef>
+              <a:fillRef idx="1">
+                <a:schemeClr val="accent1"/>
+              </a:fillRef>
+              <a:effectRef idx="0">
+                <a:schemeClr val="accent1"/>
+              </a:effectRef>
+              <a:fontRef idx="minor">
+                <a:schemeClr val="lt1"/>
+              </a:fontRef>
+            </p:style>
+            <p:txBody>
+              <a:bodyPr rtlCol="0" anchor="ctr"/>
+              <a:lstStyle/>
+              <a:p>
+                <a:pPr algn="ctr"/>
+                <a:endParaRPr lang="en-US"/>
+              </a:p>
+            </p:txBody>
+          </p:sp>
+          <p:cxnSp>
+            <p:nvCxnSpPr>
+              <p:cNvPr id="64" name="Straight Arrow Connector 63">
+                <a:extLst>
+                  <a:ext uri="{FF2B5EF4-FFF2-40B4-BE49-F238E27FC236}">
+                    <a16:creationId xmlns:a16="http://schemas.microsoft.com/office/drawing/2014/main" id="{0C8CA663-4322-CD4D-8A0C-661972CB059B}"/>
+                  </a:ext>
+                </a:extLst>
+              </p:cNvPr>
+              <p:cNvCxnSpPr>
+                <a:cxnSpLocks/>
+              </p:cNvCxnSpPr>
+              <p:nvPr/>
+            </p:nvCxnSpPr>
+            <p:spPr>
+              <a:xfrm>
+                <a:off x="1651114" y="4108478"/>
+                <a:ext cx="3716753" cy="0"/>
+              </a:xfrm>
+              <a:prstGeom prst="straightConnector1">
+                <a:avLst/>
+              </a:prstGeom>
+              <a:ln>
+                <a:prstDash val="dash"/>
+                <a:tailEnd type="triangle"/>
+              </a:ln>
+            </p:spPr>
+            <p:style>
+              <a:lnRef idx="1">
+                <a:schemeClr val="accent1"/>
+              </a:lnRef>
+              <a:fillRef idx="0">
+                <a:schemeClr val="accent1"/>
+              </a:fillRef>
+              <a:effectRef idx="0">
+                <a:schemeClr val="accent1"/>
+              </a:effectRef>
+              <a:fontRef idx="minor">
+                <a:schemeClr val="tx1"/>
+              </a:fontRef>
+            </p:style>
+          </p:cxnSp>
+          <p:sp>
+            <p:nvSpPr>
+              <p:cNvPr id="80" name="Cross 79">
+                <a:extLst>
+                  <a:ext uri="{FF2B5EF4-FFF2-40B4-BE49-F238E27FC236}">
+                    <a16:creationId xmlns:a16="http://schemas.microsoft.com/office/drawing/2014/main" id="{0F356C81-8DC2-7140-B20D-D9CF149FF391}"/>
+                  </a:ext>
+                </a:extLst>
+              </p:cNvPr>
+              <p:cNvSpPr/>
+              <p:nvPr/>
+            </p:nvSpPr>
+            <p:spPr>
+              <a:xfrm>
+                <a:off x="2116723" y="1527663"/>
+                <a:ext cx="152400" cy="152400"/>
+              </a:xfrm>
+              <a:prstGeom prst="plus">
+                <a:avLst>
+                  <a:gd name="adj" fmla="val 47525"/>
+                </a:avLst>
+              </a:prstGeom>
+            </p:spPr>
+            <p:style>
+              <a:lnRef idx="2">
+                <a:schemeClr val="accent1">
+                  <a:shade val="50000"/>
+                </a:schemeClr>
+              </a:lnRef>
+              <a:fillRef idx="1">
+                <a:schemeClr val="accent1"/>
+              </a:fillRef>
+              <a:effectRef idx="0">
+                <a:schemeClr val="accent1"/>
+              </a:effectRef>
+              <a:fontRef idx="minor">
+                <a:schemeClr val="lt1"/>
+              </a:fontRef>
+            </p:style>
+            <p:txBody>
+              <a:bodyPr rtlCol="0" anchor="ctr"/>
+              <a:lstStyle/>
+              <a:p>
+                <a:pPr algn="ctr"/>
+                <a:endParaRPr lang="en-US"/>
+              </a:p>
+            </p:txBody>
+          </p:sp>
+          <p:sp>
+            <p:nvSpPr>
+              <p:cNvPr id="81" name="Cross 80">
+                <a:extLst>
+                  <a:ext uri="{FF2B5EF4-FFF2-40B4-BE49-F238E27FC236}">
+                    <a16:creationId xmlns:a16="http://schemas.microsoft.com/office/drawing/2014/main" id="{371D9F62-77DF-AF46-9362-490A0BFDF447}"/>
+                  </a:ext>
+                </a:extLst>
+              </p:cNvPr>
+              <p:cNvSpPr/>
+              <p:nvPr/>
+            </p:nvSpPr>
+            <p:spPr>
+              <a:xfrm>
+                <a:off x="2582333" y="2087629"/>
+                <a:ext cx="152400" cy="152400"/>
+              </a:xfrm>
+              <a:prstGeom prst="plus">
+                <a:avLst>
+                  <a:gd name="adj" fmla="val 47525"/>
+                </a:avLst>
+              </a:prstGeom>
+            </p:spPr>
+            <p:style>
+              <a:lnRef idx="2">
+                <a:schemeClr val="accent1">
+                  <a:shade val="50000"/>
+                </a:schemeClr>
+              </a:lnRef>
+              <a:fillRef idx="1">
+                <a:schemeClr val="accent1"/>
+              </a:fillRef>
+              <a:effectRef idx="0">
+                <a:schemeClr val="accent1"/>
+              </a:effectRef>
+              <a:fontRef idx="minor">
+                <a:schemeClr val="lt1"/>
+              </a:fontRef>
+            </p:style>
+            <p:txBody>
+              <a:bodyPr rtlCol="0" anchor="ctr"/>
+              <a:lstStyle/>
+              <a:p>
+                <a:pPr algn="ctr"/>
+                <a:endParaRPr lang="en-US"/>
+              </a:p>
+            </p:txBody>
+          </p:sp>
+          <p:sp>
+            <p:nvSpPr>
+              <p:cNvPr id="82" name="Cross 81">
+                <a:extLst>
+                  <a:ext uri="{FF2B5EF4-FFF2-40B4-BE49-F238E27FC236}">
+                    <a16:creationId xmlns:a16="http://schemas.microsoft.com/office/drawing/2014/main" id="{6CBA2AD2-D978-AC44-AF2F-38D076B5E3F6}"/>
+                  </a:ext>
+                </a:extLst>
+              </p:cNvPr>
+              <p:cNvSpPr/>
+              <p:nvPr/>
+            </p:nvSpPr>
+            <p:spPr>
+              <a:xfrm>
+                <a:off x="3039533" y="2636228"/>
+                <a:ext cx="152400" cy="152400"/>
+              </a:xfrm>
+              <a:prstGeom prst="plus">
+                <a:avLst>
+                  <a:gd name="adj" fmla="val 47525"/>
+                </a:avLst>
+              </a:prstGeom>
+            </p:spPr>
+            <p:style>
+              <a:lnRef idx="2">
+                <a:schemeClr val="accent1">
+                  <a:shade val="50000"/>
+                </a:schemeClr>
+              </a:lnRef>
+              <a:fillRef idx="1">
+                <a:schemeClr val="accent1"/>
+              </a:fillRef>
+              <a:effectRef idx="0">
+                <a:schemeClr val="accent1"/>
+              </a:effectRef>
+              <a:fontRef idx="minor">
+                <a:schemeClr val="lt1"/>
+              </a:fontRef>
+            </p:style>
+            <p:txBody>
+              <a:bodyPr rtlCol="0" anchor="ctr"/>
+              <a:lstStyle/>
+              <a:p>
+                <a:pPr algn="ctr"/>
+                <a:endParaRPr lang="en-US"/>
+              </a:p>
+            </p:txBody>
+          </p:sp>
+          <p:sp>
+            <p:nvSpPr>
+              <p:cNvPr id="83" name="Cross 82">
+                <a:extLst>
+                  <a:ext uri="{FF2B5EF4-FFF2-40B4-BE49-F238E27FC236}">
+                    <a16:creationId xmlns:a16="http://schemas.microsoft.com/office/drawing/2014/main" id="{CD1B994C-AD2E-5749-8F91-50E473B2A629}"/>
+                  </a:ext>
+                </a:extLst>
+              </p:cNvPr>
+              <p:cNvSpPr/>
+              <p:nvPr/>
+            </p:nvSpPr>
+            <p:spPr>
+              <a:xfrm>
+                <a:off x="2116723" y="2928896"/>
+                <a:ext cx="152400" cy="152400"/>
+              </a:xfrm>
+              <a:prstGeom prst="plus">
+                <a:avLst>
+                  <a:gd name="adj" fmla="val 47525"/>
+                </a:avLst>
+              </a:prstGeom>
+            </p:spPr>
+            <p:style>
+              <a:lnRef idx="2">
+                <a:schemeClr val="accent1">
+                  <a:shade val="50000"/>
+                </a:schemeClr>
+              </a:lnRef>
+              <a:fillRef idx="1">
+                <a:schemeClr val="accent1"/>
+              </a:fillRef>
+              <a:effectRef idx="0">
+                <a:schemeClr val="accent1"/>
+              </a:effectRef>
+              <a:fontRef idx="minor">
+                <a:schemeClr val="lt1"/>
+              </a:fontRef>
+            </p:style>
+            <p:txBody>
+              <a:bodyPr rtlCol="0" anchor="ctr"/>
+              <a:lstStyle/>
+              <a:p>
+                <a:pPr algn="ctr"/>
+                <a:endParaRPr lang="en-US"/>
+              </a:p>
+            </p:txBody>
+          </p:sp>
+          <p:sp>
+            <p:nvSpPr>
+              <p:cNvPr id="84" name="Cross 83">
+                <a:extLst>
+                  <a:ext uri="{FF2B5EF4-FFF2-40B4-BE49-F238E27FC236}">
+                    <a16:creationId xmlns:a16="http://schemas.microsoft.com/office/drawing/2014/main" id="{5BD82DCB-E503-6444-8C66-37D22FEB8B23}"/>
+                  </a:ext>
+                </a:extLst>
+              </p:cNvPr>
+              <p:cNvSpPr/>
+              <p:nvPr/>
+            </p:nvSpPr>
+            <p:spPr>
+              <a:xfrm>
+                <a:off x="4938480" y="2361253"/>
+                <a:ext cx="152400" cy="152400"/>
+              </a:xfrm>
+              <a:prstGeom prst="plus">
+                <a:avLst>
+                  <a:gd name="adj" fmla="val 47525"/>
+                </a:avLst>
+              </a:prstGeom>
+            </p:spPr>
+            <p:style>
+              <a:lnRef idx="2">
+                <a:schemeClr val="accent1">
+                  <a:shade val="50000"/>
+                </a:schemeClr>
+              </a:lnRef>
+              <a:fillRef idx="1">
+                <a:schemeClr val="accent1"/>
+              </a:fillRef>
+              <a:effectRef idx="0">
+                <a:schemeClr val="accent1"/>
+              </a:effectRef>
+              <a:fontRef idx="minor">
+                <a:schemeClr val="lt1"/>
+              </a:fontRef>
+            </p:style>
+            <p:txBody>
+              <a:bodyPr rtlCol="0" anchor="ctr"/>
+              <a:lstStyle/>
+              <a:p>
+                <a:pPr algn="ctr"/>
+                <a:endParaRPr lang="en-US"/>
+              </a:p>
+            </p:txBody>
+          </p:sp>
+          <p:sp>
+            <p:nvSpPr>
+              <p:cNvPr id="85" name="TextBox 84">
+                <a:extLst>
+                  <a:ext uri="{FF2B5EF4-FFF2-40B4-BE49-F238E27FC236}">
+                    <a16:creationId xmlns:a16="http://schemas.microsoft.com/office/drawing/2014/main" id="{DE6496B8-8903-5C44-B507-AFA335384DB8}"/>
+                  </a:ext>
+                </a:extLst>
+              </p:cNvPr>
+              <p:cNvSpPr txBox="1"/>
+              <p:nvPr/>
+            </p:nvSpPr>
+            <p:spPr>
+              <a:xfrm>
+                <a:off x="3251201" y="4322106"/>
+                <a:ext cx="925253" cy="230832"/>
+              </a:xfrm>
+              <a:prstGeom prst="rect">
+                <a:avLst/>
+              </a:prstGeom>
+              <a:noFill/>
+            </p:spPr>
+            <p:txBody>
+              <a:bodyPr wrap="none" rtlCol="0">
+                <a:spAutoFit/>
+              </a:bodyPr>
+              <a:lstStyle/>
+              <a:p>
+                <a:r>
+                  <a:rPr lang="en-US" sz="900"/>
+                  <a:t>Follow-Up Time</a:t>
+                </a:r>
+                <a:endParaRPr lang="en-US"/>
+              </a:p>
+            </p:txBody>
+          </p:sp>
+          <p:sp>
+            <p:nvSpPr>
+              <p:cNvPr id="86" name="TextBox 85">
+                <a:extLst>
+                  <a:ext uri="{FF2B5EF4-FFF2-40B4-BE49-F238E27FC236}">
+                    <a16:creationId xmlns:a16="http://schemas.microsoft.com/office/drawing/2014/main" id="{A84742BA-1F75-E947-B8F8-20DA8B07733F}"/>
+                  </a:ext>
+                </a:extLst>
+              </p:cNvPr>
+              <p:cNvSpPr txBox="1"/>
+              <p:nvPr/>
+            </p:nvSpPr>
+            <p:spPr>
+              <a:xfrm>
+                <a:off x="1380219" y="4322106"/>
+                <a:ext cx="998991" cy="230832"/>
+              </a:xfrm>
+              <a:prstGeom prst="rect">
+                <a:avLst/>
+              </a:prstGeom>
+              <a:noFill/>
+            </p:spPr>
+            <p:txBody>
+              <a:bodyPr wrap="none" rtlCol="0">
+                <a:spAutoFit/>
+              </a:bodyPr>
+              <a:lstStyle/>
+              <a:p>
+                <a:r>
+                  <a:rPr lang="en-US" sz="900"/>
+                  <a:t>Study Enrollment</a:t>
+                </a:r>
+                <a:endParaRPr lang="en-US"/>
+              </a:p>
+            </p:txBody>
+          </p:sp>
+          <p:sp>
+            <p:nvSpPr>
+              <p:cNvPr id="87" name="TextBox 86">
+                <a:extLst>
+                  <a:ext uri="{FF2B5EF4-FFF2-40B4-BE49-F238E27FC236}">
+                    <a16:creationId xmlns:a16="http://schemas.microsoft.com/office/drawing/2014/main" id="{A733562A-8115-8344-B0E7-DCF4D9CD0AA9}"/>
+                  </a:ext>
+                </a:extLst>
+              </p:cNvPr>
+              <p:cNvSpPr txBox="1"/>
+              <p:nvPr/>
+            </p:nvSpPr>
+            <p:spPr>
+              <a:xfrm>
+                <a:off x="5139226" y="4215449"/>
+                <a:ext cx="998991" cy="507831"/>
+              </a:xfrm>
+              <a:prstGeom prst="rect">
+                <a:avLst/>
+              </a:prstGeom>
+              <a:noFill/>
+            </p:spPr>
+            <p:txBody>
+              <a:bodyPr wrap="square" rtlCol="0">
+                <a:spAutoFit/>
+              </a:bodyPr>
+              <a:lstStyle/>
+              <a:p>
+                <a:pPr algn="ctr"/>
+                <a:r>
+                  <a:rPr lang="en-US" sz="900"/>
+                  <a:t>Observed Outcome Distribution</a:t>
+                </a:r>
+                <a:endParaRPr lang="en-US"/>
+              </a:p>
+            </p:txBody>
+          </p:sp>
+          <p:sp>
+            <p:nvSpPr>
+              <p:cNvPr id="88" name="Oval 87">
+                <a:extLst>
+                  <a:ext uri="{FF2B5EF4-FFF2-40B4-BE49-F238E27FC236}">
+                    <a16:creationId xmlns:a16="http://schemas.microsoft.com/office/drawing/2014/main" id="{E04D9FE9-8E74-7746-9041-3028ECD9F87B}"/>
+                  </a:ext>
+                </a:extLst>
+              </p:cNvPr>
+              <p:cNvSpPr/>
+              <p:nvPr/>
+            </p:nvSpPr>
+            <p:spPr>
+              <a:xfrm>
+                <a:off x="5542640" y="956733"/>
+                <a:ext cx="152400" cy="152400"/>
+              </a:xfrm>
+              <a:prstGeom prst="ellipse">
+                <a:avLst/>
+              </a:prstGeom>
+              <a:solidFill>
+                <a:schemeClr val="bg2"/>
+              </a:solidFill>
+            </p:spPr>
+            <p:style>
+              <a:lnRef idx="2">
+                <a:schemeClr val="accent1">
+                  <a:shade val="50000"/>
+                </a:schemeClr>
+              </a:lnRef>
+              <a:fillRef idx="1">
+                <a:schemeClr val="accent1"/>
+              </a:fillRef>
+              <a:effectRef idx="0">
+                <a:schemeClr val="accent1"/>
+              </a:effectRef>
+              <a:fontRef idx="minor">
+                <a:schemeClr val="lt1"/>
+              </a:fontRef>
+            </p:style>
+            <p:txBody>
+              <a:bodyPr rtlCol="0" anchor="ctr"/>
+              <a:lstStyle/>
+              <a:p>
+                <a:pPr algn="ctr"/>
+                <a:endParaRPr lang="en-US"/>
+              </a:p>
+            </p:txBody>
+          </p:sp>
+          <p:sp>
+            <p:nvSpPr>
+              <p:cNvPr id="89" name="Oval 88">
+                <a:extLst>
+                  <a:ext uri="{FF2B5EF4-FFF2-40B4-BE49-F238E27FC236}">
+                    <a16:creationId xmlns:a16="http://schemas.microsoft.com/office/drawing/2014/main" id="{A19F4A98-C0AC-D147-9784-7B86C690B45F}"/>
+                  </a:ext>
+                </a:extLst>
+              </p:cNvPr>
+              <p:cNvSpPr/>
+              <p:nvPr/>
+            </p:nvSpPr>
+            <p:spPr>
+              <a:xfrm>
+                <a:off x="5542640" y="1244410"/>
+                <a:ext cx="152400" cy="152400"/>
+              </a:xfrm>
+              <a:prstGeom prst="ellipse">
+                <a:avLst/>
+              </a:prstGeom>
+              <a:solidFill>
+                <a:schemeClr val="bg2"/>
+              </a:solidFill>
+            </p:spPr>
+            <p:style>
+              <a:lnRef idx="2">
+                <a:schemeClr val="accent1">
+                  <a:shade val="50000"/>
+                </a:schemeClr>
+              </a:lnRef>
+              <a:fillRef idx="1">
+                <a:schemeClr val="accent1"/>
+              </a:fillRef>
+              <a:effectRef idx="0">
+                <a:schemeClr val="accent1"/>
+              </a:effectRef>
+              <a:fontRef idx="minor">
+                <a:schemeClr val="lt1"/>
+              </a:fontRef>
+            </p:style>
+            <p:txBody>
+              <a:bodyPr rtlCol="0" anchor="ctr"/>
+              <a:lstStyle/>
+              <a:p>
+                <a:pPr algn="ctr"/>
+                <a:endParaRPr lang="en-US"/>
+              </a:p>
+            </p:txBody>
+          </p:sp>
+          <p:sp>
+            <p:nvSpPr>
+              <p:cNvPr id="90" name="Oval 89">
+                <a:extLst>
+                  <a:ext uri="{FF2B5EF4-FFF2-40B4-BE49-F238E27FC236}">
+                    <a16:creationId xmlns:a16="http://schemas.microsoft.com/office/drawing/2014/main" id="{F94FF98D-51FD-DE48-A51D-7C8DAC74EA51}"/>
+                  </a:ext>
+                </a:extLst>
+              </p:cNvPr>
+              <p:cNvSpPr/>
+              <p:nvPr/>
+            </p:nvSpPr>
+            <p:spPr>
+              <a:xfrm>
+                <a:off x="5542640" y="1802830"/>
+                <a:ext cx="152400" cy="152400"/>
+              </a:xfrm>
+              <a:prstGeom prst="ellipse">
+                <a:avLst/>
+              </a:prstGeom>
+              <a:solidFill>
+                <a:schemeClr val="bg2"/>
+              </a:solidFill>
+            </p:spPr>
+            <p:style>
+              <a:lnRef idx="2">
+                <a:schemeClr val="accent1">
+                  <a:shade val="50000"/>
+                </a:schemeClr>
+              </a:lnRef>
+              <a:fillRef idx="1">
+                <a:schemeClr val="accent1"/>
+              </a:fillRef>
+              <a:effectRef idx="0">
+                <a:schemeClr val="accent1"/>
+              </a:effectRef>
+              <a:fontRef idx="minor">
+                <a:schemeClr val="lt1"/>
+              </a:fontRef>
+            </p:style>
+            <p:txBody>
+              <a:bodyPr rtlCol="0" anchor="ctr"/>
+              <a:lstStyle/>
+              <a:p>
+                <a:pPr algn="ctr"/>
+                <a:endParaRPr lang="en-US"/>
+              </a:p>
+            </p:txBody>
+          </p:sp>
+          <p:sp>
+            <p:nvSpPr>
+              <p:cNvPr id="91" name="Oval 90">
+                <a:extLst>
+                  <a:ext uri="{FF2B5EF4-FFF2-40B4-BE49-F238E27FC236}">
+                    <a16:creationId xmlns:a16="http://schemas.microsoft.com/office/drawing/2014/main" id="{5D12652F-A094-B44E-A801-0C68A52B4977}"/>
+                  </a:ext>
+                </a:extLst>
+              </p:cNvPr>
+              <p:cNvSpPr/>
+              <p:nvPr/>
+            </p:nvSpPr>
+            <p:spPr>
+              <a:xfrm>
+                <a:off x="5542640" y="2361250"/>
+                <a:ext cx="152400" cy="152400"/>
+              </a:xfrm>
+              <a:prstGeom prst="ellipse">
+                <a:avLst/>
+              </a:prstGeom>
+              <a:solidFill>
+                <a:schemeClr val="bg2"/>
+              </a:solidFill>
+            </p:spPr>
+            <p:style>
+              <a:lnRef idx="2">
+                <a:schemeClr val="accent1">
+                  <a:shade val="50000"/>
+                </a:schemeClr>
+              </a:lnRef>
+              <a:fillRef idx="1">
+                <a:schemeClr val="accent1"/>
+              </a:fillRef>
+              <a:effectRef idx="0">
+                <a:schemeClr val="accent1"/>
+              </a:effectRef>
+              <a:fontRef idx="minor">
+                <a:schemeClr val="lt1"/>
+              </a:fontRef>
+            </p:style>
+            <p:txBody>
+              <a:bodyPr rtlCol="0" anchor="ctr"/>
+              <a:lstStyle/>
+              <a:p>
+                <a:pPr algn="ctr"/>
+                <a:endParaRPr lang="en-US"/>
+              </a:p>
+            </p:txBody>
+          </p:sp>
+          <p:sp>
+            <p:nvSpPr>
+              <p:cNvPr id="93" name="Oval 92">
+                <a:extLst>
+                  <a:ext uri="{FF2B5EF4-FFF2-40B4-BE49-F238E27FC236}">
+                    <a16:creationId xmlns:a16="http://schemas.microsoft.com/office/drawing/2014/main" id="{62FDD968-0BBA-9446-AF64-F580C8ABCF0A}"/>
+                  </a:ext>
+                </a:extLst>
+              </p:cNvPr>
+              <p:cNvSpPr/>
+              <p:nvPr/>
+            </p:nvSpPr>
+            <p:spPr>
+              <a:xfrm>
+                <a:off x="5542640" y="3190413"/>
+                <a:ext cx="152400" cy="152400"/>
+              </a:xfrm>
+              <a:prstGeom prst="ellipse">
+                <a:avLst/>
+              </a:prstGeom>
+              <a:solidFill>
+                <a:schemeClr val="accent4">
+                  <a:lumMod val="60000"/>
+                  <a:lumOff val="40000"/>
+                </a:schemeClr>
+              </a:solidFill>
+            </p:spPr>
+            <p:style>
+              <a:lnRef idx="2">
+                <a:schemeClr val="accent1">
+                  <a:shade val="50000"/>
+                </a:schemeClr>
+              </a:lnRef>
+              <a:fillRef idx="1">
+                <a:schemeClr val="accent1"/>
+              </a:fillRef>
+              <a:effectRef idx="0">
+                <a:schemeClr val="accent1"/>
+              </a:effectRef>
+              <a:fontRef idx="minor">
+                <a:schemeClr val="lt1"/>
+              </a:fontRef>
+            </p:style>
+            <p:txBody>
+              <a:bodyPr rtlCol="0" anchor="ctr"/>
+              <a:lstStyle/>
+              <a:p>
+                <a:pPr algn="ctr"/>
+                <a:endParaRPr lang="en-US"/>
+              </a:p>
+            </p:txBody>
+          </p:sp>
+          <p:sp>
+            <p:nvSpPr>
+              <p:cNvPr id="94" name="Oval 93">
+                <a:extLst>
+                  <a:ext uri="{FF2B5EF4-FFF2-40B4-BE49-F238E27FC236}">
+                    <a16:creationId xmlns:a16="http://schemas.microsoft.com/office/drawing/2014/main" id="{B0893A7E-7CC0-8745-9944-6741C0841E58}"/>
+                  </a:ext>
+                </a:extLst>
+              </p:cNvPr>
+              <p:cNvSpPr/>
+              <p:nvPr/>
+            </p:nvSpPr>
+            <p:spPr>
+              <a:xfrm>
+                <a:off x="5542640" y="3472449"/>
+                <a:ext cx="152400" cy="152400"/>
+              </a:xfrm>
+              <a:prstGeom prst="ellipse">
+                <a:avLst/>
+              </a:prstGeom>
+              <a:solidFill>
+                <a:schemeClr val="accent4">
+                  <a:lumMod val="60000"/>
+                  <a:lumOff val="40000"/>
+                </a:schemeClr>
+              </a:solidFill>
+            </p:spPr>
+            <p:style>
+              <a:lnRef idx="2">
+                <a:schemeClr val="accent1">
+                  <a:shade val="50000"/>
+                </a:schemeClr>
+              </a:lnRef>
+              <a:fillRef idx="1">
+                <a:schemeClr val="accent1"/>
+              </a:fillRef>
+              <a:effectRef idx="0">
+                <a:schemeClr val="accent1"/>
+              </a:effectRef>
+              <a:fontRef idx="minor">
+                <a:schemeClr val="lt1"/>
+              </a:fontRef>
+            </p:style>
+            <p:txBody>
+              <a:bodyPr rtlCol="0" anchor="ctr"/>
+              <a:lstStyle/>
+              <a:p>
+                <a:pPr algn="ctr"/>
+                <a:endParaRPr lang="en-US"/>
+              </a:p>
+            </p:txBody>
+          </p:sp>
+          <p:sp>
+            <p:nvSpPr>
+              <p:cNvPr id="95" name="Oval 94">
+                <a:extLst>
+                  <a:ext uri="{FF2B5EF4-FFF2-40B4-BE49-F238E27FC236}">
+                    <a16:creationId xmlns:a16="http://schemas.microsoft.com/office/drawing/2014/main" id="{5E6A0179-C5AF-BA44-A014-DBAC6217C1D5}"/>
+                  </a:ext>
+                </a:extLst>
+              </p:cNvPr>
+              <p:cNvSpPr/>
+              <p:nvPr/>
+            </p:nvSpPr>
+            <p:spPr>
+              <a:xfrm>
+                <a:off x="5542640" y="3754485"/>
+                <a:ext cx="152400" cy="152400"/>
+              </a:xfrm>
+              <a:prstGeom prst="ellipse">
+                <a:avLst/>
+              </a:prstGeom>
+              <a:solidFill>
+                <a:schemeClr val="accent4">
+                  <a:lumMod val="60000"/>
+                  <a:lumOff val="40000"/>
+                </a:schemeClr>
+              </a:solidFill>
+            </p:spPr>
+            <p:style>
+              <a:lnRef idx="2">
+                <a:schemeClr val="accent1">
+                  <a:shade val="50000"/>
+                </a:schemeClr>
+              </a:lnRef>
+              <a:fillRef idx="1">
+                <a:schemeClr val="accent1"/>
+              </a:fillRef>
+              <a:effectRef idx="0">
+                <a:schemeClr val="accent1"/>
+              </a:effectRef>
+              <a:fontRef idx="minor">
+                <a:schemeClr val="lt1"/>
+              </a:fontRef>
+            </p:style>
+            <p:txBody>
+              <a:bodyPr rtlCol="0" anchor="ctr"/>
+              <a:lstStyle/>
+              <a:p>
+                <a:pPr algn="ctr"/>
+                <a:endParaRPr lang="en-US"/>
+              </a:p>
+            </p:txBody>
+          </p:sp>
+          <p:sp>
+            <p:nvSpPr>
+              <p:cNvPr id="96" name="Oval 95">
+                <a:extLst>
+                  <a:ext uri="{FF2B5EF4-FFF2-40B4-BE49-F238E27FC236}">
+                    <a16:creationId xmlns:a16="http://schemas.microsoft.com/office/drawing/2014/main" id="{996B1B03-F493-1745-935C-E1F8BF9EBD84}"/>
+                  </a:ext>
+                </a:extLst>
+              </p:cNvPr>
+              <p:cNvSpPr/>
+              <p:nvPr/>
+            </p:nvSpPr>
+            <p:spPr>
+              <a:xfrm>
+                <a:off x="5542640" y="4036521"/>
+                <a:ext cx="152400" cy="152400"/>
+              </a:xfrm>
+              <a:prstGeom prst="ellipse">
+                <a:avLst/>
+              </a:prstGeom>
+              <a:solidFill>
+                <a:schemeClr val="accent4">
+                  <a:lumMod val="60000"/>
+                  <a:lumOff val="40000"/>
+                </a:schemeClr>
+              </a:solidFill>
+            </p:spPr>
+            <p:style>
+              <a:lnRef idx="2">
+                <a:schemeClr val="accent1">
+                  <a:shade val="50000"/>
+                </a:schemeClr>
+              </a:lnRef>
+              <a:fillRef idx="1">
+                <a:schemeClr val="accent1"/>
+              </a:fillRef>
+              <a:effectRef idx="0">
+                <a:schemeClr val="accent1"/>
+              </a:effectRef>
+              <a:fontRef idx="minor">
+                <a:schemeClr val="lt1"/>
+              </a:fontRef>
+            </p:style>
+            <p:txBody>
+              <a:bodyPr rtlCol="0" anchor="ctr"/>
+              <a:lstStyle/>
+              <a:p>
+                <a:pPr algn="ctr"/>
+                <a:endParaRPr lang="en-US"/>
+              </a:p>
+            </p:txBody>
+          </p:sp>
+          <p:sp>
+            <p:nvSpPr>
+              <p:cNvPr id="98" name="Cross 97">
+                <a:extLst>
+                  <a:ext uri="{FF2B5EF4-FFF2-40B4-BE49-F238E27FC236}">
+                    <a16:creationId xmlns:a16="http://schemas.microsoft.com/office/drawing/2014/main" id="{EDBD7C09-4FBD-BB44-A483-57311F2D1FA6}"/>
+                  </a:ext>
+                </a:extLst>
+              </p:cNvPr>
+              <p:cNvSpPr/>
+              <p:nvPr/>
+            </p:nvSpPr>
+            <p:spPr>
+              <a:xfrm>
+                <a:off x="5542640" y="2361250"/>
+                <a:ext cx="152400" cy="152400"/>
+              </a:xfrm>
+              <a:prstGeom prst="plus">
+                <a:avLst>
+                  <a:gd name="adj" fmla="val 47525"/>
+                </a:avLst>
+              </a:prstGeom>
+            </p:spPr>
+            <p:style>
+              <a:lnRef idx="2">
+                <a:schemeClr val="accent1">
+                  <a:shade val="50000"/>
+                </a:schemeClr>
+              </a:lnRef>
+              <a:fillRef idx="1">
+                <a:schemeClr val="accent1"/>
+              </a:fillRef>
+              <a:effectRef idx="0">
+                <a:schemeClr val="accent1"/>
+              </a:effectRef>
+              <a:fontRef idx="minor">
+                <a:schemeClr val="lt1"/>
+              </a:fontRef>
+            </p:style>
+            <p:txBody>
+              <a:bodyPr rtlCol="0" anchor="ctr"/>
+              <a:lstStyle/>
+              <a:p>
+                <a:pPr algn="ctr"/>
+                <a:endParaRPr lang="en-US"/>
+              </a:p>
+            </p:txBody>
+          </p:sp>
+          <p:sp>
+            <p:nvSpPr>
+              <p:cNvPr id="99" name="Oval 98">
+                <a:extLst>
+                  <a:ext uri="{FF2B5EF4-FFF2-40B4-BE49-F238E27FC236}">
+                    <a16:creationId xmlns:a16="http://schemas.microsoft.com/office/drawing/2014/main" id="{D7AAF36B-8570-2543-87FD-883C7224EB02}"/>
+                  </a:ext>
+                </a:extLst>
+              </p:cNvPr>
+              <p:cNvSpPr/>
+              <p:nvPr/>
+            </p:nvSpPr>
+            <p:spPr>
+              <a:xfrm>
+                <a:off x="1240011" y="451120"/>
+                <a:ext cx="152400" cy="152400"/>
+              </a:xfrm>
+              <a:prstGeom prst="ellipse">
+                <a:avLst/>
+              </a:prstGeom>
+              <a:solidFill>
+                <a:schemeClr val="accent4">
+                  <a:lumMod val="60000"/>
+                  <a:lumOff val="40000"/>
+                </a:schemeClr>
+              </a:solidFill>
+            </p:spPr>
+            <p:style>
+              <a:lnRef idx="2">
+                <a:schemeClr val="accent1">
+                  <a:shade val="50000"/>
+                </a:schemeClr>
+              </a:lnRef>
+              <a:fillRef idx="1">
+                <a:schemeClr val="accent1"/>
+              </a:fillRef>
+              <a:effectRef idx="0">
+                <a:schemeClr val="accent1"/>
+              </a:effectRef>
+              <a:fontRef idx="minor">
+                <a:schemeClr val="lt1"/>
+              </a:fontRef>
+            </p:style>
+            <p:txBody>
+              <a:bodyPr rtlCol="0" anchor="ctr"/>
+              <a:lstStyle/>
+              <a:p>
+                <a:pPr algn="ctr"/>
+                <a:endParaRPr lang="en-US"/>
+              </a:p>
+            </p:txBody>
+          </p:sp>
+          <p:sp>
+            <p:nvSpPr>
+              <p:cNvPr id="100" name="TextBox 99">
+                <a:extLst>
+                  <a:ext uri="{FF2B5EF4-FFF2-40B4-BE49-F238E27FC236}">
+                    <a16:creationId xmlns:a16="http://schemas.microsoft.com/office/drawing/2014/main" id="{BDFFC434-C547-A74F-8F7B-A63A0C245D2B}"/>
+                  </a:ext>
+                </a:extLst>
+              </p:cNvPr>
+              <p:cNvSpPr txBox="1"/>
+              <p:nvPr/>
+            </p:nvSpPr>
+            <p:spPr>
+              <a:xfrm>
+                <a:off x="1423969" y="411904"/>
+                <a:ext cx="575799" cy="230832"/>
+              </a:xfrm>
+              <a:prstGeom prst="rect">
+                <a:avLst/>
+              </a:prstGeom>
+              <a:noFill/>
+            </p:spPr>
+            <p:txBody>
+              <a:bodyPr wrap="none" rtlCol="0">
+                <a:spAutoFit/>
+              </a:bodyPr>
+              <a:lstStyle/>
+              <a:p>
+                <a:r>
+                  <a:rPr lang="en-US" sz="900"/>
+                  <a:t>Exposed</a:t>
+                </a:r>
+                <a:endParaRPr lang="en-US"/>
+              </a:p>
+            </p:txBody>
+          </p:sp>
+          <p:sp>
+            <p:nvSpPr>
+              <p:cNvPr id="101" name="Oval 100">
+                <a:extLst>
+                  <a:ext uri="{FF2B5EF4-FFF2-40B4-BE49-F238E27FC236}">
+                    <a16:creationId xmlns:a16="http://schemas.microsoft.com/office/drawing/2014/main" id="{38C551B2-21F0-9C49-8324-3BC5DCD62160}"/>
+                  </a:ext>
+                </a:extLst>
+              </p:cNvPr>
+              <p:cNvSpPr/>
+              <p:nvPr/>
+            </p:nvSpPr>
+            <p:spPr>
+              <a:xfrm>
+                <a:off x="2099847" y="451120"/>
+                <a:ext cx="152400" cy="152400"/>
+              </a:xfrm>
+              <a:prstGeom prst="ellipse">
+                <a:avLst/>
+              </a:prstGeom>
+              <a:solidFill>
+                <a:schemeClr val="bg2"/>
+              </a:solidFill>
+            </p:spPr>
+            <p:style>
+              <a:lnRef idx="2">
+                <a:schemeClr val="accent1">
+                  <a:shade val="50000"/>
+                </a:schemeClr>
+              </a:lnRef>
+              <a:fillRef idx="1">
+                <a:schemeClr val="accent1"/>
+              </a:fillRef>
+              <a:effectRef idx="0">
+                <a:schemeClr val="accent1"/>
+              </a:effectRef>
+              <a:fontRef idx="minor">
+                <a:schemeClr val="lt1"/>
+              </a:fontRef>
+            </p:style>
+            <p:txBody>
+              <a:bodyPr rtlCol="0" anchor="ctr"/>
+              <a:lstStyle/>
+              <a:p>
+                <a:pPr algn="ctr"/>
+                <a:endParaRPr lang="en-US"/>
+              </a:p>
+            </p:txBody>
+          </p:sp>
+          <p:sp>
+            <p:nvSpPr>
+              <p:cNvPr id="102" name="TextBox 101">
+                <a:extLst>
+                  <a:ext uri="{FF2B5EF4-FFF2-40B4-BE49-F238E27FC236}">
+                    <a16:creationId xmlns:a16="http://schemas.microsoft.com/office/drawing/2014/main" id="{7A303845-01D8-AD49-A053-B5B1ABF12CC9}"/>
+                  </a:ext>
+                </a:extLst>
+              </p:cNvPr>
+              <p:cNvSpPr txBox="1"/>
+              <p:nvPr/>
+            </p:nvSpPr>
+            <p:spPr>
+              <a:xfrm>
+                <a:off x="2270359" y="411904"/>
+                <a:ext cx="712054" cy="230832"/>
+              </a:xfrm>
+              <a:prstGeom prst="rect">
+                <a:avLst/>
+              </a:prstGeom>
+              <a:noFill/>
+            </p:spPr>
+            <p:txBody>
+              <a:bodyPr wrap="none" rtlCol="0">
+                <a:spAutoFit/>
+              </a:bodyPr>
+              <a:lstStyle/>
+              <a:p>
+                <a:r>
+                  <a:rPr lang="en-US" sz="900"/>
+                  <a:t>Unexposed</a:t>
+                </a:r>
+                <a:endParaRPr lang="en-US"/>
+              </a:p>
+            </p:txBody>
+          </p:sp>
+          <p:sp>
+            <p:nvSpPr>
+              <p:cNvPr id="103" name="Cross 102">
+                <a:extLst>
+                  <a:ext uri="{FF2B5EF4-FFF2-40B4-BE49-F238E27FC236}">
+                    <a16:creationId xmlns:a16="http://schemas.microsoft.com/office/drawing/2014/main" id="{873437DD-FBDF-7D4B-9594-8360DA9DF963}"/>
+                  </a:ext>
+                </a:extLst>
+              </p:cNvPr>
+              <p:cNvSpPr/>
+              <p:nvPr/>
+            </p:nvSpPr>
+            <p:spPr>
+              <a:xfrm>
+                <a:off x="3098568" y="452451"/>
+                <a:ext cx="152400" cy="152400"/>
+              </a:xfrm>
+              <a:prstGeom prst="plus">
+                <a:avLst>
+                  <a:gd name="adj" fmla="val 47525"/>
+                </a:avLst>
+              </a:prstGeom>
+            </p:spPr>
+            <p:style>
+              <a:lnRef idx="2">
+                <a:schemeClr val="accent1">
+                  <a:shade val="50000"/>
+                </a:schemeClr>
+              </a:lnRef>
+              <a:fillRef idx="1">
+                <a:schemeClr val="accent1"/>
+              </a:fillRef>
+              <a:effectRef idx="0">
+                <a:schemeClr val="accent1"/>
+              </a:effectRef>
+              <a:fontRef idx="minor">
+                <a:schemeClr val="lt1"/>
+              </a:fontRef>
+            </p:style>
+            <p:txBody>
+              <a:bodyPr rtlCol="0" anchor="ctr"/>
+              <a:lstStyle/>
+              <a:p>
+                <a:pPr algn="ctr"/>
+                <a:endParaRPr lang="en-US"/>
+              </a:p>
+            </p:txBody>
+          </p:sp>
+          <p:sp>
+            <p:nvSpPr>
+              <p:cNvPr id="104" name="TextBox 103">
+                <a:extLst>
+                  <a:ext uri="{FF2B5EF4-FFF2-40B4-BE49-F238E27FC236}">
+                    <a16:creationId xmlns:a16="http://schemas.microsoft.com/office/drawing/2014/main" id="{E9CD5A60-AA93-664F-B151-9B675D152573}"/>
+                  </a:ext>
+                </a:extLst>
+              </p:cNvPr>
+              <p:cNvSpPr txBox="1"/>
+              <p:nvPr/>
+            </p:nvSpPr>
+            <p:spPr>
+              <a:xfrm>
+                <a:off x="3273173" y="411904"/>
+                <a:ext cx="801823" cy="230832"/>
+              </a:xfrm>
+              <a:prstGeom prst="rect">
+                <a:avLst/>
+              </a:prstGeom>
+              <a:noFill/>
+            </p:spPr>
+            <p:txBody>
+              <a:bodyPr wrap="none" rtlCol="0">
+                <a:spAutoFit/>
+              </a:bodyPr>
+              <a:lstStyle/>
+              <a:p>
+                <a:r>
+                  <a:rPr lang="en-US" sz="900"/>
+                  <a:t>Has outcome</a:t>
+                </a:r>
+                <a:endParaRPr lang="en-US"/>
+              </a:p>
+            </p:txBody>
+          </p:sp>
+        </p:grpSp>
+        <p:sp>
+          <p:nvSpPr>
+            <p:cNvPr id="315" name="Oval 314">
+              <a:extLst>
+                <a:ext uri="{FF2B5EF4-FFF2-40B4-BE49-F238E27FC236}">
+                  <a16:creationId xmlns:a16="http://schemas.microsoft.com/office/drawing/2014/main" id="{303CB46B-336D-6E4C-A6D9-09743CC48E9D}"/>
+                </a:ext>
+              </a:extLst>
+            </p:cNvPr>
+            <p:cNvSpPr/>
+            <p:nvPr/>
+          </p:nvSpPr>
+          <p:spPr>
+            <a:xfrm>
+              <a:off x="6434609" y="3190413"/>
+              <a:ext cx="152400" cy="152400"/>
+            </a:xfrm>
+            <a:prstGeom prst="ellipse">
+              <a:avLst/>
+            </a:prstGeom>
+            <a:solidFill>
+              <a:schemeClr val="accent4">
+                <a:lumMod val="60000"/>
+                <a:lumOff val="40000"/>
+              </a:schemeClr>
+            </a:solidFill>
+          </p:spPr>
+          <p:style>
+            <a:lnRef idx="2">
+              <a:schemeClr val="accent1">
+                <a:shade val="50000"/>
+              </a:schemeClr>
+            </a:lnRef>
+            <a:fillRef idx="1">
+              <a:schemeClr val="accent1"/>
+            </a:fillRef>
+            <a:effectRef idx="0">
+              <a:schemeClr val="accent1"/>
+            </a:effectRef>
+            <a:fontRef idx="minor">
+              <a:schemeClr val="lt1"/>
+            </a:fontRef>
+          </p:style>
+          <p:txBody>
+            <a:bodyPr rtlCol="0" anchor="ctr"/>
+            <a:lstStyle/>
+            <a:p>
+              <a:pPr algn="ctr"/>
+              <a:endParaRPr lang="en-US"/>
+            </a:p>
+          </p:txBody>
+        </p:sp>
+        <p:sp>
+          <p:nvSpPr>
+            <p:cNvPr id="316" name="Oval 315">
+              <a:extLst>
+                <a:ext uri="{FF2B5EF4-FFF2-40B4-BE49-F238E27FC236}">
+                  <a16:creationId xmlns:a16="http://schemas.microsoft.com/office/drawing/2014/main" id="{D40768A9-E234-4044-B46F-75269ABC77DE}"/>
+                </a:ext>
+              </a:extLst>
+            </p:cNvPr>
+            <p:cNvSpPr/>
+            <p:nvPr/>
+          </p:nvSpPr>
+          <p:spPr>
+            <a:xfrm>
+              <a:off x="6434609" y="3472449"/>
+              <a:ext cx="152400" cy="152400"/>
+            </a:xfrm>
+            <a:prstGeom prst="ellipse">
+              <a:avLst/>
+            </a:prstGeom>
+            <a:solidFill>
+              <a:schemeClr val="accent4">
+                <a:lumMod val="60000"/>
+                <a:lumOff val="40000"/>
+              </a:schemeClr>
+            </a:solidFill>
+          </p:spPr>
+          <p:style>
+            <a:lnRef idx="2">
+              <a:schemeClr val="accent1">
+                <a:shade val="50000"/>
+              </a:schemeClr>
+            </a:lnRef>
+            <a:fillRef idx="1">
+              <a:schemeClr val="accent1"/>
+            </a:fillRef>
+            <a:effectRef idx="0">
+              <a:schemeClr val="accent1"/>
+            </a:effectRef>
+            <a:fontRef idx="minor">
+              <a:schemeClr val="lt1"/>
+            </a:fontRef>
+          </p:style>
+          <p:txBody>
+            <a:bodyPr rtlCol="0" anchor="ctr"/>
+            <a:lstStyle/>
+            <a:p>
+              <a:pPr algn="ctr"/>
+              <a:endParaRPr lang="en-US"/>
+            </a:p>
+          </p:txBody>
+        </p:sp>
+        <p:sp>
+          <p:nvSpPr>
+            <p:cNvPr id="317" name="Oval 316">
+              <a:extLst>
+                <a:ext uri="{FF2B5EF4-FFF2-40B4-BE49-F238E27FC236}">
+                  <a16:creationId xmlns:a16="http://schemas.microsoft.com/office/drawing/2014/main" id="{3F84F776-70D7-1449-BA24-9215EEB9731B}"/>
+                </a:ext>
+              </a:extLst>
+            </p:cNvPr>
+            <p:cNvSpPr/>
+            <p:nvPr/>
+          </p:nvSpPr>
+          <p:spPr>
+            <a:xfrm>
+              <a:off x="6434609" y="3754485"/>
+              <a:ext cx="152400" cy="152400"/>
+            </a:xfrm>
+            <a:prstGeom prst="ellipse">
+              <a:avLst/>
+            </a:prstGeom>
+            <a:solidFill>
+              <a:schemeClr val="accent4">
+                <a:lumMod val="60000"/>
+                <a:lumOff val="40000"/>
+              </a:schemeClr>
+            </a:solidFill>
+          </p:spPr>
+          <p:style>
+            <a:lnRef idx="2">
+              <a:schemeClr val="accent1">
+                <a:shade val="50000"/>
+              </a:schemeClr>
+            </a:lnRef>
+            <a:fillRef idx="1">
+              <a:schemeClr val="accent1"/>
+            </a:fillRef>
+            <a:effectRef idx="0">
+              <a:schemeClr val="accent1"/>
+            </a:effectRef>
+            <a:fontRef idx="minor">
+              <a:schemeClr val="lt1"/>
+            </a:fontRef>
+          </p:style>
+          <p:txBody>
+            <a:bodyPr rtlCol="0" anchor="ctr"/>
+            <a:lstStyle/>
+            <a:p>
+              <a:pPr algn="ctr"/>
+              <a:endParaRPr lang="en-US"/>
+            </a:p>
+          </p:txBody>
+        </p:sp>
+        <p:sp>
+          <p:nvSpPr>
+            <p:cNvPr id="318" name="Oval 317">
+              <a:extLst>
+                <a:ext uri="{FF2B5EF4-FFF2-40B4-BE49-F238E27FC236}">
+                  <a16:creationId xmlns:a16="http://schemas.microsoft.com/office/drawing/2014/main" id="{95BAA2FC-A458-0C41-858A-8AAE2C9805D5}"/>
+                </a:ext>
+              </a:extLst>
+            </p:cNvPr>
+            <p:cNvSpPr/>
+            <p:nvPr/>
+          </p:nvSpPr>
+          <p:spPr>
+            <a:xfrm>
+              <a:off x="6434609" y="4036521"/>
+              <a:ext cx="152400" cy="152400"/>
+            </a:xfrm>
+            <a:prstGeom prst="ellipse">
+              <a:avLst/>
+            </a:prstGeom>
+            <a:solidFill>
+              <a:schemeClr val="accent4">
+                <a:lumMod val="60000"/>
+                <a:lumOff val="40000"/>
+              </a:schemeClr>
+            </a:solidFill>
+          </p:spPr>
+          <p:style>
+            <a:lnRef idx="2">
+              <a:schemeClr val="accent1">
+                <a:shade val="50000"/>
+              </a:schemeClr>
+            </a:lnRef>
+            <a:fillRef idx="1">
+              <a:schemeClr val="accent1"/>
+            </a:fillRef>
+            <a:effectRef idx="0">
+              <a:schemeClr val="accent1"/>
+            </a:effectRef>
+            <a:fontRef idx="minor">
+              <a:schemeClr val="lt1"/>
+            </a:fontRef>
+          </p:style>
+          <p:txBody>
+            <a:bodyPr rtlCol="0" anchor="ctr"/>
+            <a:lstStyle/>
+            <a:p>
+              <a:pPr algn="ctr"/>
+              <a:endParaRPr lang="en-US"/>
+            </a:p>
+          </p:txBody>
+        </p:sp>
+        <p:sp>
+          <p:nvSpPr>
+            <p:cNvPr id="320" name="TextBox 319">
+              <a:extLst>
+                <a:ext uri="{FF2B5EF4-FFF2-40B4-BE49-F238E27FC236}">
+                  <a16:creationId xmlns:a16="http://schemas.microsoft.com/office/drawing/2014/main" id="{4FEFC1B6-CBE6-E946-B4F9-B9F825B45185}"/>
+                </a:ext>
+              </a:extLst>
+            </p:cNvPr>
+            <p:cNvSpPr txBox="1"/>
+            <p:nvPr/>
+          </p:nvSpPr>
+          <p:spPr>
+            <a:xfrm>
+              <a:off x="6080242" y="4284699"/>
+              <a:ext cx="861133" cy="369332"/>
+            </a:xfrm>
+            <a:prstGeom prst="rect">
+              <a:avLst/>
+            </a:prstGeom>
+            <a:noFill/>
+          </p:spPr>
+          <p:txBody>
+            <a:bodyPr wrap="none" rtlCol="0">
+              <a:spAutoFit/>
+            </a:bodyPr>
+            <a:lstStyle/>
+            <a:p>
+              <a:r>
+                <a:rPr lang="en-US" sz="900"/>
+                <a:t>True Outcome</a:t>
+              </a:r>
+            </a:p>
+            <a:p>
+              <a:pPr algn="ctr"/>
+              <a:r>
+                <a:rPr lang="en-US" sz="900"/>
+                <a:t>Distribution</a:t>
+              </a:r>
+              <a:endParaRPr lang="en-US"/>
+            </a:p>
+          </p:txBody>
+        </p:sp>
+        <p:sp>
+          <p:nvSpPr>
+            <p:cNvPr id="321" name="Oval 320">
+              <a:extLst>
+                <a:ext uri="{FF2B5EF4-FFF2-40B4-BE49-F238E27FC236}">
+                  <a16:creationId xmlns:a16="http://schemas.microsoft.com/office/drawing/2014/main" id="{68F52C77-9FFF-2449-B7E3-8B6232D201AD}"/>
+                </a:ext>
+              </a:extLst>
+            </p:cNvPr>
+            <p:cNvSpPr/>
+            <p:nvPr/>
+          </p:nvSpPr>
+          <p:spPr>
+            <a:xfrm>
+              <a:off x="6436908" y="958334"/>
+              <a:ext cx="152400" cy="152400"/>
+            </a:xfrm>
+            <a:prstGeom prst="ellipse">
+              <a:avLst/>
+            </a:prstGeom>
+            <a:solidFill>
+              <a:schemeClr val="bg2"/>
+            </a:solidFill>
+          </p:spPr>
+          <p:style>
+            <a:lnRef idx="2">
+              <a:schemeClr val="accent1">
+                <a:shade val="50000"/>
+              </a:schemeClr>
+            </a:lnRef>
+            <a:fillRef idx="1">
+              <a:schemeClr val="accent1"/>
+            </a:fillRef>
+            <a:effectRef idx="0">
+              <a:schemeClr val="accent1"/>
+            </a:effectRef>
+            <a:fontRef idx="minor">
+              <a:schemeClr val="lt1"/>
+            </a:fontRef>
+          </p:style>
+          <p:txBody>
+            <a:bodyPr rtlCol="0" anchor="ctr"/>
+            <a:lstStyle/>
+            <a:p>
+              <a:pPr algn="ctr"/>
+              <a:endParaRPr lang="en-US"/>
+            </a:p>
+          </p:txBody>
+        </p:sp>
+        <p:sp>
+          <p:nvSpPr>
+            <p:cNvPr id="322" name="Oval 321">
+              <a:extLst>
+                <a:ext uri="{FF2B5EF4-FFF2-40B4-BE49-F238E27FC236}">
+                  <a16:creationId xmlns:a16="http://schemas.microsoft.com/office/drawing/2014/main" id="{76A3F126-015D-934B-9D23-A9FC9BEB7716}"/>
+                </a:ext>
+              </a:extLst>
+            </p:cNvPr>
+            <p:cNvSpPr/>
+            <p:nvPr/>
+          </p:nvSpPr>
+          <p:spPr>
+            <a:xfrm>
+              <a:off x="6436908" y="1237544"/>
+              <a:ext cx="152400" cy="152400"/>
+            </a:xfrm>
+            <a:prstGeom prst="ellipse">
+              <a:avLst/>
+            </a:prstGeom>
+            <a:solidFill>
+              <a:schemeClr val="bg2"/>
+            </a:solidFill>
+          </p:spPr>
+          <p:style>
+            <a:lnRef idx="2">
+              <a:schemeClr val="accent1">
+                <a:shade val="50000"/>
+              </a:schemeClr>
+            </a:lnRef>
+            <a:fillRef idx="1">
+              <a:schemeClr val="accent1"/>
+            </a:fillRef>
+            <a:effectRef idx="0">
+              <a:schemeClr val="accent1"/>
+            </a:effectRef>
+            <a:fontRef idx="minor">
+              <a:schemeClr val="lt1"/>
+            </a:fontRef>
+          </p:style>
+          <p:txBody>
+            <a:bodyPr rtlCol="0" anchor="ctr"/>
+            <a:lstStyle/>
+            <a:p>
+              <a:pPr algn="ctr"/>
+              <a:endParaRPr lang="en-US"/>
+            </a:p>
+          </p:txBody>
+        </p:sp>
+        <p:sp>
+          <p:nvSpPr>
+            <p:cNvPr id="323" name="Oval 322">
+              <a:extLst>
+                <a:ext uri="{FF2B5EF4-FFF2-40B4-BE49-F238E27FC236}">
+                  <a16:creationId xmlns:a16="http://schemas.microsoft.com/office/drawing/2014/main" id="{093EACB1-58E0-7243-BE67-8685E5C942FC}"/>
+                </a:ext>
+              </a:extLst>
+            </p:cNvPr>
+            <p:cNvSpPr/>
+            <p:nvPr/>
+          </p:nvSpPr>
+          <p:spPr>
+            <a:xfrm>
+              <a:off x="6436908" y="1516754"/>
+              <a:ext cx="152400" cy="152400"/>
+            </a:xfrm>
+            <a:prstGeom prst="ellipse">
+              <a:avLst/>
+            </a:prstGeom>
+            <a:solidFill>
+              <a:schemeClr val="bg2"/>
+            </a:solidFill>
+          </p:spPr>
+          <p:style>
+            <a:lnRef idx="2">
+              <a:schemeClr val="accent1">
+                <a:shade val="50000"/>
+              </a:schemeClr>
+            </a:lnRef>
+            <a:fillRef idx="1">
+              <a:schemeClr val="accent1"/>
+            </a:fillRef>
+            <a:effectRef idx="0">
+              <a:schemeClr val="accent1"/>
+            </a:effectRef>
+            <a:fontRef idx="minor">
+              <a:schemeClr val="lt1"/>
+            </a:fontRef>
+          </p:style>
+          <p:txBody>
+            <a:bodyPr rtlCol="0" anchor="ctr"/>
+            <a:lstStyle/>
+            <a:p>
+              <a:pPr algn="ctr"/>
+              <a:endParaRPr lang="en-US"/>
+            </a:p>
+          </p:txBody>
+        </p:sp>
+        <p:sp>
+          <p:nvSpPr>
+            <p:cNvPr id="324" name="Oval 323">
+              <a:extLst>
+                <a:ext uri="{FF2B5EF4-FFF2-40B4-BE49-F238E27FC236}">
+                  <a16:creationId xmlns:a16="http://schemas.microsoft.com/office/drawing/2014/main" id="{13A8F14A-3595-4244-A2D0-1CF4A3BAB661}"/>
+                </a:ext>
+              </a:extLst>
+            </p:cNvPr>
+            <p:cNvSpPr/>
+            <p:nvPr/>
+          </p:nvSpPr>
+          <p:spPr>
+            <a:xfrm>
+              <a:off x="6436908" y="1795964"/>
+              <a:ext cx="152400" cy="152400"/>
+            </a:xfrm>
+            <a:prstGeom prst="ellipse">
+              <a:avLst/>
+            </a:prstGeom>
+            <a:solidFill>
+              <a:schemeClr val="bg2"/>
+            </a:solidFill>
+          </p:spPr>
+          <p:style>
+            <a:lnRef idx="2">
+              <a:schemeClr val="accent1">
+                <a:shade val="50000"/>
+              </a:schemeClr>
+            </a:lnRef>
+            <a:fillRef idx="1">
+              <a:schemeClr val="accent1"/>
+            </a:fillRef>
+            <a:effectRef idx="0">
+              <a:schemeClr val="accent1"/>
+            </a:effectRef>
+            <a:fontRef idx="minor">
+              <a:schemeClr val="lt1"/>
+            </a:fontRef>
+          </p:style>
+          <p:txBody>
+            <a:bodyPr rtlCol="0" anchor="ctr"/>
+            <a:lstStyle/>
+            <a:p>
+              <a:pPr algn="ctr"/>
+              <a:endParaRPr lang="en-US"/>
+            </a:p>
+          </p:txBody>
+        </p:sp>
+        <p:sp>
+          <p:nvSpPr>
+            <p:cNvPr id="325" name="Oval 324">
+              <a:extLst>
+                <a:ext uri="{FF2B5EF4-FFF2-40B4-BE49-F238E27FC236}">
+                  <a16:creationId xmlns:a16="http://schemas.microsoft.com/office/drawing/2014/main" id="{91D61A58-C5DA-1349-AD62-A235C18D502E}"/>
+                </a:ext>
+              </a:extLst>
+            </p:cNvPr>
+            <p:cNvSpPr/>
+            <p:nvPr/>
+          </p:nvSpPr>
+          <p:spPr>
+            <a:xfrm>
+              <a:off x="6436908" y="2075174"/>
+              <a:ext cx="152400" cy="152400"/>
+            </a:xfrm>
+            <a:prstGeom prst="ellipse">
+              <a:avLst/>
+            </a:prstGeom>
+            <a:solidFill>
+              <a:schemeClr val="bg2"/>
+            </a:solidFill>
+          </p:spPr>
+          <p:style>
+            <a:lnRef idx="2">
+              <a:schemeClr val="accent1">
+                <a:shade val="50000"/>
+              </a:schemeClr>
+            </a:lnRef>
+            <a:fillRef idx="1">
+              <a:schemeClr val="accent1"/>
+            </a:fillRef>
+            <a:effectRef idx="0">
+              <a:schemeClr val="accent1"/>
+            </a:effectRef>
+            <a:fontRef idx="minor">
+              <a:schemeClr val="lt1"/>
+            </a:fontRef>
+          </p:style>
+          <p:txBody>
+            <a:bodyPr rtlCol="0" anchor="ctr"/>
+            <a:lstStyle/>
+            <a:p>
+              <a:pPr algn="ctr"/>
+              <a:endParaRPr lang="en-US"/>
+            </a:p>
+          </p:txBody>
+        </p:sp>
+        <p:sp>
+          <p:nvSpPr>
+            <p:cNvPr id="326" name="Oval 325">
+              <a:extLst>
+                <a:ext uri="{FF2B5EF4-FFF2-40B4-BE49-F238E27FC236}">
+                  <a16:creationId xmlns:a16="http://schemas.microsoft.com/office/drawing/2014/main" id="{84510327-3A3D-F64C-82CA-713B8B0C757B}"/>
+                </a:ext>
+              </a:extLst>
+            </p:cNvPr>
+            <p:cNvSpPr/>
+            <p:nvPr/>
+          </p:nvSpPr>
+          <p:spPr>
+            <a:xfrm>
+              <a:off x="6436908" y="2354384"/>
+              <a:ext cx="152400" cy="152400"/>
+            </a:xfrm>
+            <a:prstGeom prst="ellipse">
+              <a:avLst/>
+            </a:prstGeom>
+            <a:solidFill>
+              <a:schemeClr val="bg2"/>
+            </a:solidFill>
+          </p:spPr>
+          <p:style>
+            <a:lnRef idx="2">
+              <a:schemeClr val="accent1">
+                <a:shade val="50000"/>
+              </a:schemeClr>
+            </a:lnRef>
+            <a:fillRef idx="1">
+              <a:schemeClr val="accent1"/>
+            </a:fillRef>
+            <a:effectRef idx="0">
+              <a:schemeClr val="accent1"/>
+            </a:effectRef>
+            <a:fontRef idx="minor">
+              <a:schemeClr val="lt1"/>
+            </a:fontRef>
+          </p:style>
+          <p:txBody>
+            <a:bodyPr rtlCol="0" anchor="ctr"/>
+            <a:lstStyle/>
+            <a:p>
+              <a:pPr algn="ctr"/>
+              <a:endParaRPr lang="en-US"/>
+            </a:p>
+          </p:txBody>
+        </p:sp>
+        <p:sp>
+          <p:nvSpPr>
+            <p:cNvPr id="327" name="Oval 326">
+              <a:extLst>
+                <a:ext uri="{FF2B5EF4-FFF2-40B4-BE49-F238E27FC236}">
+                  <a16:creationId xmlns:a16="http://schemas.microsoft.com/office/drawing/2014/main" id="{25590E4E-047F-134B-86AF-9CF28A12967D}"/>
+                </a:ext>
+              </a:extLst>
+            </p:cNvPr>
+            <p:cNvSpPr/>
+            <p:nvPr/>
+          </p:nvSpPr>
+          <p:spPr>
+            <a:xfrm>
+              <a:off x="6436908" y="2633594"/>
+              <a:ext cx="152400" cy="152400"/>
+            </a:xfrm>
+            <a:prstGeom prst="ellipse">
+              <a:avLst/>
+            </a:prstGeom>
+            <a:solidFill>
+              <a:schemeClr val="bg2"/>
+            </a:solidFill>
+          </p:spPr>
+          <p:style>
+            <a:lnRef idx="2">
+              <a:schemeClr val="accent1">
+                <a:shade val="50000"/>
+              </a:schemeClr>
+            </a:lnRef>
+            <a:fillRef idx="1">
+              <a:schemeClr val="accent1"/>
+            </a:fillRef>
+            <a:effectRef idx="0">
+              <a:schemeClr val="accent1"/>
+            </a:effectRef>
+            <a:fontRef idx="minor">
+              <a:schemeClr val="lt1"/>
+            </a:fontRef>
+          </p:style>
+          <p:txBody>
+            <a:bodyPr rtlCol="0" anchor="ctr"/>
+            <a:lstStyle/>
+            <a:p>
+              <a:pPr algn="ctr"/>
+              <a:endParaRPr lang="en-US"/>
+            </a:p>
+          </p:txBody>
+        </p:sp>
+        <p:sp>
+          <p:nvSpPr>
+            <p:cNvPr id="328" name="Oval 327">
+              <a:extLst>
+                <a:ext uri="{FF2B5EF4-FFF2-40B4-BE49-F238E27FC236}">
+                  <a16:creationId xmlns:a16="http://schemas.microsoft.com/office/drawing/2014/main" id="{EA4BAA5A-A135-DF4B-91DC-20FE29AD209B}"/>
+                </a:ext>
+              </a:extLst>
+            </p:cNvPr>
+            <p:cNvSpPr/>
+            <p:nvPr/>
+          </p:nvSpPr>
+          <p:spPr>
+            <a:xfrm>
+              <a:off x="6436908" y="2912804"/>
+              <a:ext cx="152400" cy="152400"/>
+            </a:xfrm>
+            <a:prstGeom prst="ellipse">
+              <a:avLst/>
+            </a:prstGeom>
+            <a:solidFill>
+              <a:schemeClr val="bg2"/>
+            </a:solidFill>
+          </p:spPr>
+          <p:style>
+            <a:lnRef idx="2">
+              <a:schemeClr val="accent1">
+                <a:shade val="50000"/>
+              </a:schemeClr>
+            </a:lnRef>
+            <a:fillRef idx="1">
+              <a:schemeClr val="accent1"/>
+            </a:fillRef>
+            <a:effectRef idx="0">
+              <a:schemeClr val="accent1"/>
+            </a:effectRef>
+            <a:fontRef idx="minor">
+              <a:schemeClr val="lt1"/>
+            </a:fontRef>
+          </p:style>
+          <p:txBody>
+            <a:bodyPr rtlCol="0" anchor="ctr"/>
+            <a:lstStyle/>
+            <a:p>
+              <a:pPr algn="ctr"/>
+              <a:endParaRPr lang="en-US"/>
+            </a:p>
+          </p:txBody>
+        </p:sp>
+        <p:sp>
+          <p:nvSpPr>
+            <p:cNvPr id="329" name="Cross 328">
+              <a:extLst>
+                <a:ext uri="{FF2B5EF4-FFF2-40B4-BE49-F238E27FC236}">
+                  <a16:creationId xmlns:a16="http://schemas.microsoft.com/office/drawing/2014/main" id="{E811B566-34CE-724C-9A0C-88D1D7394C7B}"/>
+                </a:ext>
+              </a:extLst>
+            </p:cNvPr>
+            <p:cNvSpPr/>
+            <p:nvPr/>
+          </p:nvSpPr>
+          <p:spPr>
+            <a:xfrm>
+              <a:off x="6431468" y="2354384"/>
+              <a:ext cx="152400" cy="152400"/>
+            </a:xfrm>
+            <a:prstGeom prst="plus">
+              <a:avLst>
+                <a:gd name="adj" fmla="val 47525"/>
+              </a:avLst>
+            </a:prstGeom>
+          </p:spPr>
+          <p:style>
+            <a:lnRef idx="2">
+              <a:schemeClr val="accent1">
+                <a:shade val="50000"/>
+              </a:schemeClr>
+            </a:lnRef>
+            <a:fillRef idx="1">
+              <a:schemeClr val="accent1"/>
+            </a:fillRef>
+            <a:effectRef idx="0">
+              <a:schemeClr val="accent1"/>
+            </a:effectRef>
+            <a:fontRef idx="minor">
+              <a:schemeClr val="lt1"/>
+            </a:fontRef>
+          </p:style>
+          <p:txBody>
+            <a:bodyPr rtlCol="0" anchor="ctr"/>
+            <a:lstStyle/>
+            <a:p>
+              <a:pPr algn="ctr"/>
+              <a:endParaRPr lang="en-US"/>
+            </a:p>
+          </p:txBody>
+        </p:sp>
+        <p:sp>
+          <p:nvSpPr>
+            <p:cNvPr id="330" name="Cross 329">
+              <a:extLst>
+                <a:ext uri="{FF2B5EF4-FFF2-40B4-BE49-F238E27FC236}">
+                  <a16:creationId xmlns:a16="http://schemas.microsoft.com/office/drawing/2014/main" id="{BB404331-42C6-D647-8AF7-78CC746398D0}"/>
+                </a:ext>
+              </a:extLst>
+            </p:cNvPr>
+            <p:cNvSpPr/>
+            <p:nvPr/>
+          </p:nvSpPr>
+          <p:spPr>
+            <a:xfrm>
+              <a:off x="6435584" y="2071249"/>
+              <a:ext cx="152400" cy="152400"/>
+            </a:xfrm>
+            <a:prstGeom prst="plus">
+              <a:avLst>
+                <a:gd name="adj" fmla="val 47525"/>
+              </a:avLst>
+            </a:prstGeom>
+          </p:spPr>
+          <p:style>
+            <a:lnRef idx="2">
+              <a:schemeClr val="accent1">
+                <a:shade val="50000"/>
+              </a:schemeClr>
+            </a:lnRef>
+            <a:fillRef idx="1">
+              <a:schemeClr val="accent1"/>
+            </a:fillRef>
+            <a:effectRef idx="0">
+              <a:schemeClr val="accent1"/>
+            </a:effectRef>
+            <a:fontRef idx="minor">
+              <a:schemeClr val="lt1"/>
+            </a:fontRef>
+          </p:style>
+          <p:txBody>
+            <a:bodyPr rtlCol="0" anchor="ctr"/>
+            <a:lstStyle/>
+            <a:p>
+              <a:pPr algn="ctr"/>
+              <a:endParaRPr lang="en-US"/>
+            </a:p>
+          </p:txBody>
+        </p:sp>
+        <p:sp>
+          <p:nvSpPr>
+            <p:cNvPr id="331" name="Cross 330">
+              <a:extLst>
+                <a:ext uri="{FF2B5EF4-FFF2-40B4-BE49-F238E27FC236}">
+                  <a16:creationId xmlns:a16="http://schemas.microsoft.com/office/drawing/2014/main" id="{ACCA1A96-B387-EF4F-BF63-02E6EF60D442}"/>
+                </a:ext>
+              </a:extLst>
+            </p:cNvPr>
+            <p:cNvSpPr/>
+            <p:nvPr/>
+          </p:nvSpPr>
+          <p:spPr>
+            <a:xfrm>
+              <a:off x="6431468" y="1528031"/>
+              <a:ext cx="152400" cy="152400"/>
+            </a:xfrm>
+            <a:prstGeom prst="plus">
+              <a:avLst>
+                <a:gd name="adj" fmla="val 47525"/>
+              </a:avLst>
+            </a:prstGeom>
+          </p:spPr>
+          <p:style>
+            <a:lnRef idx="2">
+              <a:schemeClr val="accent1">
+                <a:shade val="50000"/>
+              </a:schemeClr>
+            </a:lnRef>
+            <a:fillRef idx="1">
+              <a:schemeClr val="accent1"/>
+            </a:fillRef>
+            <a:effectRef idx="0">
+              <a:schemeClr val="accent1"/>
+            </a:effectRef>
+            <a:fontRef idx="minor">
+              <a:schemeClr val="lt1"/>
+            </a:fontRef>
+          </p:style>
+          <p:txBody>
+            <a:bodyPr rtlCol="0" anchor="ctr"/>
+            <a:lstStyle/>
+            <a:p>
+              <a:pPr algn="ctr"/>
+              <a:endParaRPr lang="en-US"/>
+            </a:p>
+          </p:txBody>
+        </p:sp>
+        <p:sp>
+          <p:nvSpPr>
+            <p:cNvPr id="332" name="Cross 331">
+              <a:extLst>
+                <a:ext uri="{FF2B5EF4-FFF2-40B4-BE49-F238E27FC236}">
+                  <a16:creationId xmlns:a16="http://schemas.microsoft.com/office/drawing/2014/main" id="{CED51779-CFE6-2147-8740-9C9EB8CD940F}"/>
+                </a:ext>
+              </a:extLst>
+            </p:cNvPr>
+            <p:cNvSpPr/>
+            <p:nvPr/>
+          </p:nvSpPr>
+          <p:spPr>
+            <a:xfrm>
+              <a:off x="6431468" y="2630763"/>
+              <a:ext cx="152400" cy="152400"/>
+            </a:xfrm>
+            <a:prstGeom prst="plus">
+              <a:avLst>
+                <a:gd name="adj" fmla="val 47525"/>
+              </a:avLst>
+            </a:prstGeom>
+          </p:spPr>
+          <p:style>
+            <a:lnRef idx="2">
+              <a:schemeClr val="accent1">
+                <a:shade val="50000"/>
+              </a:schemeClr>
+            </a:lnRef>
+            <a:fillRef idx="1">
+              <a:schemeClr val="accent1"/>
+            </a:fillRef>
+            <a:effectRef idx="0">
+              <a:schemeClr val="accent1"/>
+            </a:effectRef>
+            <a:fontRef idx="minor">
+              <a:schemeClr val="lt1"/>
+            </a:fontRef>
+          </p:style>
+          <p:txBody>
+            <a:bodyPr rtlCol="0" anchor="ctr"/>
+            <a:lstStyle/>
+            <a:p>
+              <a:pPr algn="ctr"/>
+              <a:endParaRPr lang="en-US"/>
+            </a:p>
+          </p:txBody>
+        </p:sp>
+        <p:sp>
+          <p:nvSpPr>
+            <p:cNvPr id="333" name="Cross 332">
+              <a:extLst>
+                <a:ext uri="{FF2B5EF4-FFF2-40B4-BE49-F238E27FC236}">
+                  <a16:creationId xmlns:a16="http://schemas.microsoft.com/office/drawing/2014/main" id="{BC6E8208-265D-F044-8FBF-1E9EFDAF5277}"/>
+                </a:ext>
+              </a:extLst>
+            </p:cNvPr>
+            <p:cNvSpPr/>
+            <p:nvPr/>
+          </p:nvSpPr>
+          <p:spPr>
+            <a:xfrm>
+              <a:off x="6431468" y="2912238"/>
+              <a:ext cx="152400" cy="152400"/>
+            </a:xfrm>
+            <a:prstGeom prst="plus">
+              <a:avLst>
+                <a:gd name="adj" fmla="val 47525"/>
+              </a:avLst>
+            </a:prstGeom>
+          </p:spPr>
+          <p:style>
+            <a:lnRef idx="2">
+              <a:schemeClr val="accent1">
+                <a:shade val="50000"/>
+              </a:schemeClr>
+            </a:lnRef>
+            <a:fillRef idx="1">
+              <a:schemeClr val="accent1"/>
+            </a:fillRef>
+            <a:effectRef idx="0">
+              <a:schemeClr val="accent1"/>
+            </a:effectRef>
+            <a:fontRef idx="minor">
+              <a:schemeClr val="lt1"/>
+            </a:fontRef>
+          </p:style>
+          <p:txBody>
+            <a:bodyPr rtlCol="0" anchor="ctr"/>
+            <a:lstStyle/>
+            <a:p>
+              <a:pPr algn="ctr"/>
+              <a:endParaRPr lang="en-US"/>
+            </a:p>
+          </p:txBody>
+        </p:sp>
+      </p:grpSp>
+    </p:spTree>
+    <p:extLst>
+      <p:ext uri="{BB962C8B-B14F-4D97-AF65-F5344CB8AC3E}">
+        <p14:creationId xmlns:p14="http://schemas.microsoft.com/office/powerpoint/2010/main" val="2589766114"/>
+      </p:ext>
+    </p:extLst>
+  </p:cSld>
+  <p:clrMapOvr>
+    <a:masterClrMapping/>
+  </p:clrMapOvr>
+</p:sld>
+</file>
+
+<file path=ppt/slides/slide3.xml><?xml version="1.0" encoding="utf-8"?>
+<p:sld xmlns:a="http://schemas.openxmlformats.org/drawingml/2006/main" xmlns:r="http://schemas.openxmlformats.org/officeDocument/2006/relationships" xmlns:p="http://schemas.openxmlformats.org/presentationml/2006/main">
+  <p:cSld>
+    <p:spTree>
+      <p:nvGrpSpPr>
+        <p:cNvPr id="1" name=""/>
+        <p:cNvGrpSpPr/>
+        <p:nvPr/>
+      </p:nvGrpSpPr>
+      <p:grpSpPr>
+        <a:xfrm>
+          <a:off x="0" y="0"/>
+          <a:ext cx="0" cy="0"/>
+          <a:chOff x="0" y="0"/>
+          <a:chExt cx="0" cy="0"/>
+        </a:xfrm>
+      </p:grpSpPr>
+      <p:sp>
+        <p:nvSpPr>
+          <p:cNvPr id="5" name="TextBox 4">
+            <a:extLst>
+              <a:ext uri="{FF2B5EF4-FFF2-40B4-BE49-F238E27FC236}">
+                <a16:creationId xmlns:a16="http://schemas.microsoft.com/office/drawing/2014/main" id="{C2DC509D-9BBD-BC4A-83AA-762CCBB0AF5C}"/>
+              </a:ext>
+            </a:extLst>
+          </p:cNvPr>
+          <p:cNvSpPr txBox="1"/>
+          <p:nvPr/>
+        </p:nvSpPr>
+        <p:spPr>
+          <a:xfrm>
+            <a:off x="2600837" y="1444837"/>
+            <a:ext cx="1200696" cy="369332"/>
+          </a:xfrm>
+          <a:prstGeom prst="rect">
+            <a:avLst/>
+          </a:prstGeom>
+          <a:noFill/>
+        </p:spPr>
+        <p:txBody>
+          <a:bodyPr wrap="square" rtlCol="0">
+            <a:spAutoFit/>
+          </a:bodyPr>
+          <a:lstStyle/>
+          <a:p>
+            <a:pPr algn="ctr"/>
+            <a:r>
+              <a:rPr lang="en-US" sz="900"/>
+              <a:t>Experimental Treatment for Stroke</a:t>
+            </a:r>
+            <a:endParaRPr lang="en-US"/>
+          </a:p>
+        </p:txBody>
+      </p:sp>
+      <p:sp>
+        <p:nvSpPr>
+          <p:cNvPr id="6" name="TextBox 5">
+            <a:extLst>
+              <a:ext uri="{FF2B5EF4-FFF2-40B4-BE49-F238E27FC236}">
+                <a16:creationId xmlns:a16="http://schemas.microsoft.com/office/drawing/2014/main" id="{A5BBC19C-2FCC-4549-A251-5D0464178162}"/>
+              </a:ext>
+            </a:extLst>
+          </p:cNvPr>
+          <p:cNvSpPr txBox="1"/>
+          <p:nvPr/>
+        </p:nvSpPr>
+        <p:spPr>
+          <a:xfrm>
+            <a:off x="4658237" y="1444837"/>
+            <a:ext cx="997497" cy="369332"/>
+          </a:xfrm>
+          <a:prstGeom prst="rect">
+            <a:avLst/>
+          </a:prstGeom>
+          <a:noFill/>
+        </p:spPr>
+        <p:txBody>
+          <a:bodyPr wrap="square" rtlCol="0">
+            <a:spAutoFit/>
+          </a:bodyPr>
+          <a:lstStyle/>
+          <a:p>
+            <a:pPr algn="ctr"/>
+            <a:r>
+              <a:rPr lang="en-US" sz="900"/>
+              <a:t>Death from Stroke</a:t>
+            </a:r>
+            <a:endParaRPr lang="en-US"/>
+          </a:p>
+        </p:txBody>
+      </p:sp>
+      <p:sp>
+        <p:nvSpPr>
+          <p:cNvPr id="7" name="TextBox 6">
+            <a:extLst>
+              <a:ext uri="{FF2B5EF4-FFF2-40B4-BE49-F238E27FC236}">
+                <a16:creationId xmlns:a16="http://schemas.microsoft.com/office/drawing/2014/main" id="{BDD6E6CD-AC98-8944-84D3-CF8F3EEAC7A4}"/>
+              </a:ext>
+            </a:extLst>
+          </p:cNvPr>
+          <p:cNvSpPr txBox="1"/>
+          <p:nvPr/>
+        </p:nvSpPr>
+        <p:spPr>
+          <a:xfrm>
+            <a:off x="3660740" y="699770"/>
+            <a:ext cx="997497" cy="230832"/>
+          </a:xfrm>
+          <a:prstGeom prst="rect">
+            <a:avLst/>
+          </a:prstGeom>
+          <a:noFill/>
+        </p:spPr>
+        <p:txBody>
+          <a:bodyPr wrap="square" rtlCol="0">
+            <a:spAutoFit/>
+          </a:bodyPr>
+          <a:lstStyle/>
+          <a:p>
+            <a:pPr algn="ctr"/>
+            <a:r>
+              <a:rPr lang="en-US" sz="900"/>
+              <a:t>Stroke Severity</a:t>
+            </a:r>
+            <a:endParaRPr lang="en-US"/>
+          </a:p>
+        </p:txBody>
+      </p:sp>
+      <p:cxnSp>
+        <p:nvCxnSpPr>
+          <p:cNvPr id="9" name="Straight Arrow Connector 8">
+            <a:extLst>
+              <a:ext uri="{FF2B5EF4-FFF2-40B4-BE49-F238E27FC236}">
+                <a16:creationId xmlns:a16="http://schemas.microsoft.com/office/drawing/2014/main" id="{C7712683-9795-494D-8FF4-92C8D9F68D1A}"/>
+              </a:ext>
+            </a:extLst>
+          </p:cNvPr>
+          <p:cNvCxnSpPr>
+            <a:cxnSpLocks/>
+            <a:stCxn id="5" idx="3"/>
+            <a:endCxn id="6" idx="1"/>
+          </p:cNvCxnSpPr>
+          <p:nvPr/>
+        </p:nvCxnSpPr>
+        <p:spPr>
+          <a:xfrm>
+            <a:off x="3801533" y="1629503"/>
+            <a:ext cx="856704" cy="0"/>
+          </a:xfrm>
+          <a:prstGeom prst="straightConnector1">
+            <a:avLst/>
+          </a:prstGeom>
+          <a:ln>
+            <a:tailEnd type="triangle"/>
+          </a:ln>
+        </p:spPr>
+        <p:style>
+          <a:lnRef idx="1">
+            <a:schemeClr val="accent1"/>
+          </a:lnRef>
+          <a:fillRef idx="0">
+            <a:schemeClr val="accent1"/>
+          </a:fillRef>
+          <a:effectRef idx="0">
+            <a:schemeClr val="accent1"/>
+          </a:effectRef>
+          <a:fontRef idx="minor">
+            <a:schemeClr val="tx1"/>
+          </a:fontRef>
+        </p:style>
+      </p:cxnSp>
+      <p:cxnSp>
+        <p:nvCxnSpPr>
+          <p:cNvPr id="11" name="Straight Arrow Connector 10">
+            <a:extLst>
+              <a:ext uri="{FF2B5EF4-FFF2-40B4-BE49-F238E27FC236}">
+                <a16:creationId xmlns:a16="http://schemas.microsoft.com/office/drawing/2014/main" id="{E57990DE-CDBC-754B-88DB-0F7B37C325CD}"/>
+              </a:ext>
+            </a:extLst>
+          </p:cNvPr>
+          <p:cNvCxnSpPr>
+            <a:cxnSpLocks/>
+            <a:stCxn id="7" idx="2"/>
+            <a:endCxn id="5" idx="0"/>
+          </p:cNvCxnSpPr>
+          <p:nvPr/>
+        </p:nvCxnSpPr>
+        <p:spPr>
+          <a:xfrm flipH="1">
+            <a:off x="3201185" y="930602"/>
+            <a:ext cx="958304" cy="514235"/>
+          </a:xfrm>
+          <a:prstGeom prst="straightConnector1">
+            <a:avLst/>
+          </a:prstGeom>
+          <a:ln>
+            <a:prstDash val="dash"/>
+            <a:tailEnd type="triangle"/>
+          </a:ln>
+        </p:spPr>
+        <p:style>
+          <a:lnRef idx="1">
+            <a:schemeClr val="accent1"/>
+          </a:lnRef>
+          <a:fillRef idx="0">
+            <a:schemeClr val="accent1"/>
+          </a:fillRef>
+          <a:effectRef idx="0">
+            <a:schemeClr val="accent1"/>
+          </a:effectRef>
+          <a:fontRef idx="minor">
+            <a:schemeClr val="tx1"/>
+          </a:fontRef>
+        </p:style>
+      </p:cxnSp>
+      <p:cxnSp>
+        <p:nvCxnSpPr>
+          <p:cNvPr id="14" name="Straight Arrow Connector 13">
+            <a:extLst>
+              <a:ext uri="{FF2B5EF4-FFF2-40B4-BE49-F238E27FC236}">
+                <a16:creationId xmlns:a16="http://schemas.microsoft.com/office/drawing/2014/main" id="{90C901EF-46D2-E54B-9ADC-667B17504758}"/>
+              </a:ext>
+            </a:extLst>
+          </p:cNvPr>
+          <p:cNvCxnSpPr>
+            <a:stCxn id="7" idx="2"/>
+            <a:endCxn id="6" idx="0"/>
+          </p:cNvCxnSpPr>
+          <p:nvPr/>
+        </p:nvCxnSpPr>
+        <p:spPr>
+          <a:xfrm>
+            <a:off x="4159489" y="930602"/>
+            <a:ext cx="997497" cy="514235"/>
+          </a:xfrm>
+          <a:prstGeom prst="straightConnector1">
+            <a:avLst/>
+          </a:prstGeom>
+          <a:ln>
+            <a:prstDash val="dash"/>
+            <a:tailEnd type="triangle"/>
+          </a:ln>
+        </p:spPr>
+        <p:style>
+          <a:lnRef idx="1">
+            <a:schemeClr val="accent1"/>
+          </a:lnRef>
+          <a:fillRef idx="0">
+            <a:schemeClr val="accent1"/>
+          </a:fillRef>
+          <a:effectRef idx="0">
+            <a:schemeClr val="accent1"/>
+          </a:effectRef>
+          <a:fontRef idx="minor">
+            <a:schemeClr val="tx1"/>
+          </a:fontRef>
+        </p:style>
+      </p:cxnSp>
+    </p:spTree>
+    <p:extLst>
+      <p:ext uri="{BB962C8B-B14F-4D97-AF65-F5344CB8AC3E}">
+        <p14:creationId xmlns:p14="http://schemas.microsoft.com/office/powerpoint/2010/main" val="2277516832"/>
       </p:ext>
     </p:extLst>
   </p:cSld>

</xml_diff>